<commit_message>
Updated the final presentation
</commit_message>
<xml_diff>
--- a/Power point files/Final presentation.pptx
+++ b/Power point files/Final presentation.pptx
@@ -5,10 +5,10 @@
     <p:sldMasterId id="2147483768" r:id="rId1"/>
   </p:sldMasterIdLst>
   <p:notesMasterIdLst>
-    <p:notesMasterId r:id="rId22"/>
+    <p:notesMasterId r:id="rId25"/>
   </p:notesMasterIdLst>
   <p:handoutMasterIdLst>
-    <p:handoutMasterId r:id="rId23"/>
+    <p:handoutMasterId r:id="rId26"/>
   </p:handoutMasterIdLst>
   <p:sldIdLst>
     <p:sldId id="257" r:id="rId2"/>
@@ -16,21 +16,24 @@
     <p:sldId id="280" r:id="rId4"/>
     <p:sldId id="279" r:id="rId5"/>
     <p:sldId id="281" r:id="rId6"/>
-    <p:sldId id="282" r:id="rId7"/>
-    <p:sldId id="283" r:id="rId8"/>
-    <p:sldId id="284" r:id="rId9"/>
-    <p:sldId id="285" r:id="rId10"/>
-    <p:sldId id="286" r:id="rId11"/>
-    <p:sldId id="287" r:id="rId12"/>
-    <p:sldId id="288" r:id="rId13"/>
-    <p:sldId id="289" r:id="rId14"/>
-    <p:sldId id="290" r:id="rId15"/>
-    <p:sldId id="291" r:id="rId16"/>
-    <p:sldId id="278" r:id="rId17"/>
-    <p:sldId id="274" r:id="rId18"/>
-    <p:sldId id="276" r:id="rId19"/>
-    <p:sldId id="277" r:id="rId20"/>
-    <p:sldId id="270" r:id="rId21"/>
+    <p:sldId id="292" r:id="rId7"/>
+    <p:sldId id="282" r:id="rId8"/>
+    <p:sldId id="283" r:id="rId9"/>
+    <p:sldId id="284" r:id="rId10"/>
+    <p:sldId id="285" r:id="rId11"/>
+    <p:sldId id="286" r:id="rId12"/>
+    <p:sldId id="287" r:id="rId13"/>
+    <p:sldId id="288" r:id="rId14"/>
+    <p:sldId id="289" r:id="rId15"/>
+    <p:sldId id="293" r:id="rId16"/>
+    <p:sldId id="290" r:id="rId17"/>
+    <p:sldId id="291" r:id="rId18"/>
+    <p:sldId id="294" r:id="rId19"/>
+    <p:sldId id="278" r:id="rId20"/>
+    <p:sldId id="274" r:id="rId21"/>
+    <p:sldId id="276" r:id="rId22"/>
+    <p:sldId id="277" r:id="rId23"/>
+    <p:sldId id="270" r:id="rId24"/>
   </p:sldIdLst>
   <p:sldSz cx="12192000" cy="6858000"/>
   <p:notesSz cx="6858000" cy="9144000"/>
@@ -139,6 +142,7 @@
             <p14:sldId id="280"/>
             <p14:sldId id="279"/>
             <p14:sldId id="281"/>
+            <p14:sldId id="292"/>
             <p14:sldId id="282"/>
             <p14:sldId id="283"/>
             <p14:sldId id="284"/>
@@ -147,8 +151,10 @@
             <p14:sldId id="287"/>
             <p14:sldId id="288"/>
             <p14:sldId id="289"/>
+            <p14:sldId id="293"/>
             <p14:sldId id="290"/>
             <p14:sldId id="291"/>
+            <p14:sldId id="294"/>
             <p14:sldId id="278"/>
             <p14:sldId id="274"/>
             <p14:sldId id="276"/>
@@ -14195,7 +14201,7 @@
               <a:t>Final</a:t>
             </a:r>
             <a:r>
-              <a:rPr lang="fi-FI" sz="3000"/>
+              <a:rPr lang="fi-FI" sz="3000" dirty="0"/>
               <a:t> Presentation</a:t>
             </a:r>
             <a:endParaRPr lang="en-US" sz="3000" dirty="0"/>
@@ -14237,7 +14243,7 @@
           <p:cNvPr id="2" name="Title 1">
             <a:extLst>
               <a:ext uri="{FF2B5EF4-FFF2-40B4-BE49-F238E27FC236}">
-                <a16:creationId xmlns:a16="http://schemas.microsoft.com/office/drawing/2014/main" id="{268B4DD8-9CD5-4790-8BB9-7639F8654E6F}"/>
+                <a16:creationId xmlns:a16="http://schemas.microsoft.com/office/drawing/2014/main" id="{3DBA98CA-884F-4C6E-A9F0-B599557B85A7}"/>
               </a:ext>
             </a:extLst>
           </p:cNvPr>
@@ -14253,7 +14259,35 @@
           <a:bodyPr/>
           <a:lstStyle/>
           <a:p>
-            <a:endParaRPr lang="fi-FI"/>
+            <a:r>
+              <a:rPr lang="fi-FI" dirty="0" err="1"/>
+              <a:t>Clean</a:t>
+            </a:r>
+            <a:r>
+              <a:rPr lang="fi-FI" dirty="0"/>
+              <a:t> </a:t>
+            </a:r>
+            <a:r>
+              <a:rPr lang="fi-FI" dirty="0" err="1"/>
+              <a:t>overlapping</a:t>
+            </a:r>
+            <a:r>
+              <a:rPr lang="fi-FI" dirty="0"/>
+              <a:t> </a:t>
+            </a:r>
+            <a:r>
+              <a:rPr lang="fi-FI" dirty="0" err="1"/>
+              <a:t>bounding</a:t>
+            </a:r>
+            <a:r>
+              <a:rPr lang="fi-FI" dirty="0"/>
+              <a:t> </a:t>
+            </a:r>
+            <a:r>
+              <a:rPr lang="fi-FI" dirty="0" err="1"/>
+              <a:t>boxes</a:t>
+            </a:r>
+            <a:endParaRPr lang="fi-FI" dirty="0"/>
           </a:p>
         </p:txBody>
       </p:sp>
@@ -14262,7 +14296,7 @@
           <p:cNvPr id="3" name="Content Placeholder 2">
             <a:extLst>
               <a:ext uri="{FF2B5EF4-FFF2-40B4-BE49-F238E27FC236}">
-                <a16:creationId xmlns:a16="http://schemas.microsoft.com/office/drawing/2014/main" id="{7250358A-BD62-4F04-8CE5-5A18459E1924}"/>
+                <a16:creationId xmlns:a16="http://schemas.microsoft.com/office/drawing/2014/main" id="{71182AAF-924A-4F15-8312-CA9C0249E41D}"/>
               </a:ext>
             </a:extLst>
           </p:cNvPr>
@@ -14278,7 +14312,248 @@
           <a:bodyPr/>
           <a:lstStyle/>
           <a:p>
-            <a:endParaRPr lang="fi-FI"/>
+            <a:r>
+              <a:rPr lang="fi-FI" u="sng" dirty="0"/>
+              <a:t>Basic idea of </a:t>
+            </a:r>
+            <a:r>
+              <a:rPr lang="fi-FI" u="sng" dirty="0" err="1"/>
+              <a:t>algorithm</a:t>
+            </a:r>
+            <a:r>
+              <a:rPr lang="fi-FI" u="sng" dirty="0"/>
+              <a:t>:</a:t>
+            </a:r>
+          </a:p>
+          <a:p>
+            <a:pPr lvl="1"/>
+            <a:r>
+              <a:rPr lang="fi-FI" sz="2400" dirty="0"/>
+              <a:t>If </a:t>
+            </a:r>
+            <a:r>
+              <a:rPr lang="fi-FI" sz="2400" dirty="0" err="1"/>
+              <a:t>there</a:t>
+            </a:r>
+            <a:r>
+              <a:rPr lang="fi-FI" sz="2400" dirty="0"/>
+              <a:t> </a:t>
+            </a:r>
+            <a:r>
+              <a:rPr lang="fi-FI" sz="2400" dirty="0" err="1"/>
+              <a:t>are</a:t>
+            </a:r>
+            <a:r>
+              <a:rPr lang="fi-FI" sz="2400" dirty="0"/>
+              <a:t> </a:t>
+            </a:r>
+            <a:r>
+              <a:rPr lang="fi-FI" sz="2400" dirty="0" err="1"/>
+              <a:t>same</a:t>
+            </a:r>
+            <a:r>
+              <a:rPr lang="fi-FI" sz="2400" dirty="0"/>
+              <a:t> </a:t>
+            </a:r>
+            <a:r>
+              <a:rPr lang="fi-FI" sz="2400" dirty="0" err="1"/>
+              <a:t>classes</a:t>
+            </a:r>
+            <a:r>
+              <a:rPr lang="fi-FI" sz="2400" dirty="0"/>
+              <a:t> </a:t>
+            </a:r>
+            <a:r>
+              <a:rPr lang="fi-FI" sz="2400" dirty="0" err="1"/>
+              <a:t>present</a:t>
+            </a:r>
+            <a:r>
+              <a:rPr lang="fi-FI" sz="2400" dirty="0"/>
+              <a:t> in </a:t>
+            </a:r>
+            <a:r>
+              <a:rPr lang="fi-FI" sz="2400" dirty="0" err="1"/>
+              <a:t>the</a:t>
+            </a:r>
+            <a:r>
+              <a:rPr lang="fi-FI" sz="2400" dirty="0"/>
+              <a:t> </a:t>
+            </a:r>
+            <a:r>
+              <a:rPr lang="fi-FI" sz="2400" dirty="0" err="1"/>
+              <a:t>same</a:t>
+            </a:r>
+            <a:r>
+              <a:rPr lang="fi-FI" sz="2400" dirty="0"/>
+              <a:t> video </a:t>
+            </a:r>
+            <a:r>
+              <a:rPr lang="fi-FI" sz="2400" dirty="0" err="1"/>
+              <a:t>frame</a:t>
+            </a:r>
+            <a:r>
+              <a:rPr lang="fi-FI" sz="2400" dirty="0"/>
+              <a:t>:</a:t>
+            </a:r>
+          </a:p>
+          <a:p>
+            <a:pPr lvl="2"/>
+            <a:r>
+              <a:rPr lang="fi-FI" dirty="0"/>
+              <a:t>If </a:t>
+            </a:r>
+            <a:r>
+              <a:rPr lang="fi-FI" dirty="0" err="1"/>
+              <a:t>there</a:t>
+            </a:r>
+            <a:r>
+              <a:rPr lang="fi-FI" dirty="0"/>
+              <a:t> </a:t>
+            </a:r>
+            <a:r>
+              <a:rPr lang="fi-FI" dirty="0" err="1"/>
+              <a:t>are</a:t>
+            </a:r>
+            <a:r>
+              <a:rPr lang="fi-FI" dirty="0"/>
+              <a:t> </a:t>
+            </a:r>
+            <a:r>
+              <a:rPr lang="fi-FI" dirty="0" err="1"/>
+              <a:t>overlapping</a:t>
+            </a:r>
+            <a:r>
+              <a:rPr lang="fi-FI" dirty="0"/>
+              <a:t> </a:t>
+            </a:r>
+            <a:r>
+              <a:rPr lang="fi-FI" dirty="0" err="1"/>
+              <a:t>bounding</a:t>
+            </a:r>
+            <a:r>
+              <a:rPr lang="fi-FI" dirty="0"/>
+              <a:t> </a:t>
+            </a:r>
+            <a:r>
+              <a:rPr lang="fi-FI" dirty="0" err="1"/>
+              <a:t>boxes</a:t>
+            </a:r>
+            <a:r>
+              <a:rPr lang="fi-FI" dirty="0"/>
+              <a:t> (</a:t>
+            </a:r>
+            <a:r>
+              <a:rPr lang="fi-FI" dirty="0" err="1"/>
+              <a:t>determined</a:t>
+            </a:r>
+            <a:r>
+              <a:rPr lang="fi-FI" dirty="0"/>
+              <a:t> </a:t>
+            </a:r>
+            <a:r>
+              <a:rPr lang="fi-FI" dirty="0" err="1"/>
+              <a:t>by</a:t>
+            </a:r>
+            <a:r>
+              <a:rPr lang="fi-FI" dirty="0"/>
+              <a:t> </a:t>
+            </a:r>
+            <a:r>
+              <a:rPr lang="fi-FI" dirty="0" err="1"/>
+              <a:t>IoU</a:t>
+            </a:r>
+            <a:r>
+              <a:rPr lang="fi-FI" dirty="0"/>
+              <a:t>):</a:t>
+            </a:r>
+          </a:p>
+          <a:p>
+            <a:pPr lvl="3"/>
+            <a:r>
+              <a:rPr lang="fi-FI" sz="2400" dirty="0"/>
+              <a:t>If </a:t>
+            </a:r>
+            <a:r>
+              <a:rPr lang="fi-FI" sz="2400" dirty="0" err="1"/>
+              <a:t>overlap</a:t>
+            </a:r>
+            <a:r>
+              <a:rPr lang="fi-FI" sz="2400" dirty="0"/>
+              <a:t> </a:t>
+            </a:r>
+            <a:r>
+              <a:rPr lang="fi-FI" sz="2400" dirty="0" err="1"/>
+              <a:t>exceeds</a:t>
+            </a:r>
+            <a:r>
+              <a:rPr lang="fi-FI" sz="2400" dirty="0"/>
+              <a:t> a </a:t>
+            </a:r>
+            <a:r>
+              <a:rPr lang="fi-FI" sz="2400" dirty="0" err="1"/>
+              <a:t>predetermined</a:t>
+            </a:r>
+            <a:r>
+              <a:rPr lang="fi-FI" sz="2400" dirty="0"/>
+              <a:t> </a:t>
+            </a:r>
+            <a:r>
+              <a:rPr lang="fi-FI" sz="2400" dirty="0" err="1"/>
+              <a:t>threshold</a:t>
+            </a:r>
+            <a:r>
+              <a:rPr lang="fi-FI" sz="2400" dirty="0"/>
+              <a:t>:</a:t>
+            </a:r>
+          </a:p>
+          <a:p>
+            <a:pPr lvl="4">
+              <a:buFont typeface="Wingdings" panose="05000000000000000000" pitchFamily="2" charset="2"/>
+              <a:buChar char="Ø"/>
+            </a:pPr>
+            <a:r>
+              <a:rPr lang="fi-FI" sz="2400" b="1" dirty="0" err="1"/>
+              <a:t>Remove</a:t>
+            </a:r>
+            <a:r>
+              <a:rPr lang="fi-FI" sz="2400" b="1" dirty="0"/>
+              <a:t> </a:t>
+            </a:r>
+            <a:r>
+              <a:rPr lang="fi-FI" sz="2400" b="1" dirty="0" err="1"/>
+              <a:t>bounding</a:t>
+            </a:r>
+            <a:r>
+              <a:rPr lang="fi-FI" sz="2400" b="1" dirty="0"/>
+              <a:t> box </a:t>
+            </a:r>
+            <a:r>
+              <a:rPr lang="fi-FI" sz="2400" b="1" dirty="0" err="1"/>
+              <a:t>with</a:t>
+            </a:r>
+            <a:r>
+              <a:rPr lang="fi-FI" sz="2400" b="1" dirty="0"/>
+              <a:t> </a:t>
+            </a:r>
+            <a:r>
+              <a:rPr lang="fi-FI" sz="2400" b="1" dirty="0" err="1"/>
+              <a:t>least</a:t>
+            </a:r>
+            <a:r>
+              <a:rPr lang="fi-FI" sz="2400" b="1" dirty="0"/>
+              <a:t> </a:t>
+            </a:r>
+            <a:r>
+              <a:rPr lang="fi-FI" sz="2400" b="1" dirty="0" err="1"/>
+              <a:t>confidence</a:t>
+            </a:r>
+            <a:endParaRPr lang="fi-FI" sz="2400" b="1" dirty="0"/>
+          </a:p>
+          <a:p>
+            <a:r>
+              <a:rPr lang="fi-FI" i="1" dirty="0"/>
+              <a:t>Video demo</a:t>
+            </a:r>
           </a:p>
         </p:txBody>
       </p:sp>
@@ -14287,7 +14562,7 @@
           <p:cNvPr id="4" name="Slide Number Placeholder 3">
             <a:extLst>
               <a:ext uri="{FF2B5EF4-FFF2-40B4-BE49-F238E27FC236}">
-                <a16:creationId xmlns:a16="http://schemas.microsoft.com/office/drawing/2014/main" id="{F1413DE8-61B4-4C99-BCC2-65C6E1A83F78}"/>
+                <a16:creationId xmlns:a16="http://schemas.microsoft.com/office/drawing/2014/main" id="{E174144E-02AB-4DBE-AADB-986851563288}"/>
               </a:ext>
             </a:extLst>
           </p:cNvPr>
@@ -14319,7 +14594,7 @@
     </p:spTree>
     <p:extLst>
       <p:ext uri="{BB962C8B-B14F-4D97-AF65-F5344CB8AC3E}">
-        <p14:creationId xmlns:p14="http://schemas.microsoft.com/office/powerpoint/2010/main" val="1636399772"/>
+        <p14:creationId xmlns:p14="http://schemas.microsoft.com/office/powerpoint/2010/main" val="1128859354"/>
       </p:ext>
     </p:extLst>
   </p:cSld>
@@ -14351,7 +14626,7 @@
           <p:cNvPr id="2" name="Title 1">
             <a:extLst>
               <a:ext uri="{FF2B5EF4-FFF2-40B4-BE49-F238E27FC236}">
-                <a16:creationId xmlns:a16="http://schemas.microsoft.com/office/drawing/2014/main" id="{1A4442A3-B542-4293-B200-D4205B2D9CC4}"/>
+                <a16:creationId xmlns:a16="http://schemas.microsoft.com/office/drawing/2014/main" id="{268B4DD8-9CD5-4790-8BB9-7639F8654E6F}"/>
               </a:ext>
             </a:extLst>
           </p:cNvPr>
@@ -14367,7 +14642,23 @@
           <a:bodyPr/>
           <a:lstStyle/>
           <a:p>
-            <a:endParaRPr lang="fi-FI"/>
+            <a:r>
+              <a:rPr lang="fi-FI" dirty="0"/>
+              <a:t>Class </a:t>
+            </a:r>
+            <a:r>
+              <a:rPr lang="fi-FI" dirty="0" err="1"/>
+              <a:t>mapping</a:t>
+            </a:r>
+            <a:r>
+              <a:rPr lang="fi-FI" dirty="0"/>
+              <a:t> </a:t>
+            </a:r>
+            <a:r>
+              <a:rPr lang="fi-FI" dirty="0" err="1"/>
+              <a:t>function</a:t>
+            </a:r>
+            <a:endParaRPr lang="fi-FI" dirty="0"/>
           </a:p>
         </p:txBody>
       </p:sp>
@@ -14376,7 +14667,7 @@
           <p:cNvPr id="3" name="Content Placeholder 2">
             <a:extLst>
               <a:ext uri="{FF2B5EF4-FFF2-40B4-BE49-F238E27FC236}">
-                <a16:creationId xmlns:a16="http://schemas.microsoft.com/office/drawing/2014/main" id="{385F8FE2-7D9F-482F-AFC0-756A493565A6}"/>
+                <a16:creationId xmlns:a16="http://schemas.microsoft.com/office/drawing/2014/main" id="{7250358A-BD62-4F04-8CE5-5A18459E1924}"/>
               </a:ext>
             </a:extLst>
           </p:cNvPr>
@@ -14392,7 +14683,85 @@
           <a:bodyPr/>
           <a:lstStyle/>
           <a:p>
-            <a:endParaRPr lang="fi-FI"/>
+            <a:r>
+              <a:rPr lang="fi-FI" dirty="0"/>
+              <a:t>It is </a:t>
+            </a:r>
+            <a:r>
+              <a:rPr lang="fi-FI" dirty="0" err="1"/>
+              <a:t>possible</a:t>
+            </a:r>
+            <a:r>
+              <a:rPr lang="fi-FI" dirty="0"/>
+              <a:t> to </a:t>
+            </a:r>
+            <a:r>
+              <a:rPr lang="fi-FI" dirty="0" err="1"/>
+              <a:t>change</a:t>
+            </a:r>
+            <a:r>
+              <a:rPr lang="fi-FI" dirty="0"/>
+              <a:t> </a:t>
+            </a:r>
+            <a:r>
+              <a:rPr lang="fi-FI" dirty="0" err="1"/>
+              <a:t>the</a:t>
+            </a:r>
+            <a:r>
+              <a:rPr lang="fi-FI" dirty="0"/>
+              <a:t> </a:t>
+            </a:r>
+            <a:r>
+              <a:rPr lang="fi-FI" dirty="0" err="1"/>
+              <a:t>class</a:t>
+            </a:r>
+            <a:r>
+              <a:rPr lang="fi-FI" dirty="0"/>
+              <a:t> </a:t>
+            </a:r>
+            <a:r>
+              <a:rPr lang="fi-FI" dirty="0" err="1"/>
+              <a:t>indeces</a:t>
+            </a:r>
+            <a:r>
+              <a:rPr lang="fi-FI" dirty="0"/>
+              <a:t> and </a:t>
+            </a:r>
+            <a:r>
+              <a:rPr lang="fi-FI" dirty="0" err="1"/>
+              <a:t>names</a:t>
+            </a:r>
+            <a:r>
+              <a:rPr lang="fi-FI" dirty="0"/>
+              <a:t> of </a:t>
+            </a:r>
+            <a:r>
+              <a:rPr lang="fi-FI" dirty="0" err="1"/>
+              <a:t>classes</a:t>
+            </a:r>
+            <a:r>
+              <a:rPr lang="fi-FI" dirty="0"/>
+              <a:t> into </a:t>
+            </a:r>
+            <a:r>
+              <a:rPr lang="fi-FI" dirty="0" err="1"/>
+              <a:t>arbitrary</a:t>
+            </a:r>
+            <a:r>
+              <a:rPr lang="fi-FI" dirty="0"/>
+              <a:t> </a:t>
+            </a:r>
+            <a:r>
+              <a:rPr lang="fi-FI" dirty="0" err="1"/>
+              <a:t>classes</a:t>
+            </a:r>
+            <a:endParaRPr lang="fi-FI" dirty="0"/>
+          </a:p>
+          <a:p>
+            <a:r>
+              <a:rPr lang="fi-FI" i="1" dirty="0"/>
+              <a:t>Video demo</a:t>
+            </a:r>
           </a:p>
         </p:txBody>
       </p:sp>
@@ -14401,7 +14770,7 @@
           <p:cNvPr id="4" name="Slide Number Placeholder 3">
             <a:extLst>
               <a:ext uri="{FF2B5EF4-FFF2-40B4-BE49-F238E27FC236}">
-                <a16:creationId xmlns:a16="http://schemas.microsoft.com/office/drawing/2014/main" id="{E7A72D8F-76B1-4974-9589-CCE9C9937FB1}"/>
+                <a16:creationId xmlns:a16="http://schemas.microsoft.com/office/drawing/2014/main" id="{F1413DE8-61B4-4C99-BCC2-65C6E1A83F78}"/>
               </a:ext>
             </a:extLst>
           </p:cNvPr>
@@ -14433,7 +14802,7 @@
     </p:spTree>
     <p:extLst>
       <p:ext uri="{BB962C8B-B14F-4D97-AF65-F5344CB8AC3E}">
-        <p14:creationId xmlns:p14="http://schemas.microsoft.com/office/powerpoint/2010/main" val="3284953867"/>
+        <p14:creationId xmlns:p14="http://schemas.microsoft.com/office/powerpoint/2010/main" val="1636399772"/>
       </p:ext>
     </p:extLst>
   </p:cSld>
@@ -14465,7 +14834,7 @@
           <p:cNvPr id="2" name="Title 1">
             <a:extLst>
               <a:ext uri="{FF2B5EF4-FFF2-40B4-BE49-F238E27FC236}">
-                <a16:creationId xmlns:a16="http://schemas.microsoft.com/office/drawing/2014/main" id="{73F99B42-EFB3-49E9-9F9F-FAF7CF576355}"/>
+                <a16:creationId xmlns:a16="http://schemas.microsoft.com/office/drawing/2014/main" id="{1A4442A3-B542-4293-B200-D4205B2D9CC4}"/>
               </a:ext>
             </a:extLst>
           </p:cNvPr>
@@ -14481,7 +14850,15 @@
           <a:bodyPr/>
           <a:lstStyle/>
           <a:p>
-            <a:endParaRPr lang="fi-FI"/>
+            <a:r>
+              <a:rPr lang="fi-FI" dirty="0"/>
+              <a:t>Audio </a:t>
+            </a:r>
+            <a:r>
+              <a:rPr lang="fi-FI" dirty="0" err="1"/>
+              <a:t>powermap</a:t>
+            </a:r>
+            <a:endParaRPr lang="fi-FI" dirty="0"/>
           </a:p>
         </p:txBody>
       </p:sp>
@@ -14490,7 +14867,7 @@
           <p:cNvPr id="3" name="Content Placeholder 2">
             <a:extLst>
               <a:ext uri="{FF2B5EF4-FFF2-40B4-BE49-F238E27FC236}">
-                <a16:creationId xmlns:a16="http://schemas.microsoft.com/office/drawing/2014/main" id="{9C558AC8-F038-424D-8806-63EF6C6D2E0A}"/>
+                <a16:creationId xmlns:a16="http://schemas.microsoft.com/office/drawing/2014/main" id="{385F8FE2-7D9F-482F-AFC0-756A493565A6}"/>
               </a:ext>
             </a:extLst>
           </p:cNvPr>
@@ -14506,7 +14883,120 @@
           <a:bodyPr/>
           <a:lstStyle/>
           <a:p>
-            <a:endParaRPr lang="fi-FI"/>
+            <a:r>
+              <a:rPr lang="fi-FI" dirty="0"/>
+              <a:t>A </a:t>
+            </a:r>
+            <a:r>
+              <a:rPr lang="fi-FI" dirty="0" err="1"/>
+              <a:t>function</a:t>
+            </a:r>
+            <a:r>
+              <a:rPr lang="fi-FI" dirty="0"/>
+              <a:t> made </a:t>
+            </a:r>
+            <a:r>
+              <a:rPr lang="fi-FI" dirty="0" err="1"/>
+              <a:t>by</a:t>
+            </a:r>
+            <a:r>
+              <a:rPr lang="fi-FI" dirty="0"/>
+              <a:t> </a:t>
+            </a:r>
+            <a:r>
+              <a:rPr lang="fi-FI" dirty="0" err="1"/>
+              <a:t>Archontis</a:t>
+            </a:r>
+            <a:r>
+              <a:rPr lang="fi-FI" dirty="0"/>
+              <a:t> </a:t>
+            </a:r>
+            <a:r>
+              <a:rPr lang="fi-FI" dirty="0" err="1"/>
+              <a:t>converts</a:t>
+            </a:r>
+            <a:r>
+              <a:rPr lang="fi-FI" dirty="0"/>
+              <a:t> </a:t>
+            </a:r>
+            <a:r>
+              <a:rPr lang="fi-FI" dirty="0" err="1"/>
+              <a:t>the</a:t>
+            </a:r>
+            <a:r>
+              <a:rPr lang="fi-FI" dirty="0"/>
+              <a:t> B-</a:t>
+            </a:r>
+            <a:r>
+              <a:rPr lang="fi-FI" dirty="0" err="1"/>
+              <a:t>format</a:t>
+            </a:r>
+            <a:r>
+              <a:rPr lang="fi-FI" dirty="0"/>
+              <a:t> </a:t>
+            </a:r>
+            <a:r>
+              <a:rPr lang="fi-FI" dirty="0" err="1"/>
+              <a:t>audio</a:t>
+            </a:r>
+            <a:r>
+              <a:rPr lang="fi-FI" dirty="0"/>
+              <a:t> into a </a:t>
+            </a:r>
+            <a:r>
+              <a:rPr lang="fi-FI" dirty="0" err="1"/>
+              <a:t>powermap</a:t>
+            </a:r>
+            <a:endParaRPr lang="fi-FI" dirty="0"/>
+          </a:p>
+          <a:p>
+            <a:pPr lvl="1"/>
+            <a:r>
+              <a:rPr lang="fi-FI" dirty="0"/>
+              <a:t>MUSIC </a:t>
+            </a:r>
+            <a:r>
+              <a:rPr lang="fi-FI" dirty="0" err="1"/>
+              <a:t>algorithm</a:t>
+            </a:r>
+            <a:r>
+              <a:rPr lang="fi-FI" dirty="0"/>
+              <a:t> </a:t>
+            </a:r>
+            <a:r>
+              <a:rPr lang="fi-FI" dirty="0" err="1"/>
+              <a:t>used</a:t>
+            </a:r>
+            <a:endParaRPr lang="fi-FI" dirty="0"/>
+          </a:p>
+          <a:p>
+            <a:pPr lvl="1"/>
+            <a:r>
+              <a:rPr lang="fi-FI" dirty="0"/>
+              <a:t>(Some </a:t>
+            </a:r>
+            <a:r>
+              <a:rPr lang="fi-FI" dirty="0" err="1"/>
+              <a:t>other</a:t>
+            </a:r>
+            <a:r>
+              <a:rPr lang="fi-FI" dirty="0"/>
+              <a:t> </a:t>
+            </a:r>
+            <a:r>
+              <a:rPr lang="fi-FI" dirty="0" err="1"/>
+              <a:t>details</a:t>
+            </a:r>
+            <a:r>
+              <a:rPr lang="fi-FI" dirty="0"/>
+              <a:t>?)</a:t>
+            </a:r>
+          </a:p>
+          <a:p>
+            <a:r>
+              <a:rPr lang="fi-FI" i="1" dirty="0"/>
+              <a:t>Video demo</a:t>
+            </a:r>
           </a:p>
         </p:txBody>
       </p:sp>
@@ -14515,7 +15005,7 @@
           <p:cNvPr id="4" name="Slide Number Placeholder 3">
             <a:extLst>
               <a:ext uri="{FF2B5EF4-FFF2-40B4-BE49-F238E27FC236}">
-                <a16:creationId xmlns:a16="http://schemas.microsoft.com/office/drawing/2014/main" id="{1B8CD3D2-353B-42FF-9DAA-64138799091C}"/>
+                <a16:creationId xmlns:a16="http://schemas.microsoft.com/office/drawing/2014/main" id="{E7A72D8F-76B1-4974-9589-CCE9C9937FB1}"/>
               </a:ext>
             </a:extLst>
           </p:cNvPr>
@@ -14547,7 +15037,7 @@
     </p:spTree>
     <p:extLst>
       <p:ext uri="{BB962C8B-B14F-4D97-AF65-F5344CB8AC3E}">
-        <p14:creationId xmlns:p14="http://schemas.microsoft.com/office/powerpoint/2010/main" val="3804781030"/>
+        <p14:creationId xmlns:p14="http://schemas.microsoft.com/office/powerpoint/2010/main" val="3284953867"/>
       </p:ext>
     </p:extLst>
   </p:cSld>
@@ -14579,7 +15069,7 @@
           <p:cNvPr id="2" name="Title 1">
             <a:extLst>
               <a:ext uri="{FF2B5EF4-FFF2-40B4-BE49-F238E27FC236}">
-                <a16:creationId xmlns:a16="http://schemas.microsoft.com/office/drawing/2014/main" id="{AC2056CA-4783-4C24-AF36-A7138C82CEC9}"/>
+                <a16:creationId xmlns:a16="http://schemas.microsoft.com/office/drawing/2014/main" id="{73F99B42-EFB3-49E9-9F9F-FAF7CF576355}"/>
               </a:ext>
             </a:extLst>
           </p:cNvPr>
@@ -14595,7 +15085,43 @@
           <a:bodyPr/>
           <a:lstStyle/>
           <a:p>
-            <a:endParaRPr lang="fi-FI"/>
+            <a:r>
+              <a:rPr lang="fi-FI" dirty="0" err="1"/>
+              <a:t>Crop</a:t>
+            </a:r>
+            <a:r>
+              <a:rPr lang="fi-FI" dirty="0"/>
+              <a:t> </a:t>
+            </a:r>
+            <a:r>
+              <a:rPr lang="fi-FI" dirty="0" err="1"/>
+              <a:t>powermap</a:t>
+            </a:r>
+            <a:r>
+              <a:rPr lang="fi-FI" dirty="0"/>
+              <a:t> </a:t>
+            </a:r>
+            <a:r>
+              <a:rPr lang="fi-FI" dirty="0" err="1"/>
+              <a:t>using</a:t>
+            </a:r>
+            <a:r>
+              <a:rPr lang="fi-FI" dirty="0"/>
+              <a:t> </a:t>
+            </a:r>
+            <a:r>
+              <a:rPr lang="fi-FI" dirty="0" err="1"/>
+              <a:t>bounding</a:t>
+            </a:r>
+            <a:r>
+              <a:rPr lang="fi-FI" dirty="0"/>
+              <a:t> </a:t>
+            </a:r>
+            <a:r>
+              <a:rPr lang="fi-FI" dirty="0" err="1"/>
+              <a:t>boxes</a:t>
+            </a:r>
+            <a:endParaRPr lang="fi-FI" dirty="0"/>
           </a:p>
         </p:txBody>
       </p:sp>
@@ -14604,7 +15130,7 @@
           <p:cNvPr id="3" name="Content Placeholder 2">
             <a:extLst>
               <a:ext uri="{FF2B5EF4-FFF2-40B4-BE49-F238E27FC236}">
-                <a16:creationId xmlns:a16="http://schemas.microsoft.com/office/drawing/2014/main" id="{44B6144D-DAAA-42DD-9B3F-0BF64997EAB4}"/>
+                <a16:creationId xmlns:a16="http://schemas.microsoft.com/office/drawing/2014/main" id="{9C558AC8-F038-424D-8806-63EF6C6D2E0A}"/>
               </a:ext>
             </a:extLst>
           </p:cNvPr>
@@ -14620,7 +15146,32 @@
           <a:bodyPr/>
           <a:lstStyle/>
           <a:p>
-            <a:endParaRPr lang="fi-FI"/>
+            <a:r>
+              <a:rPr lang="fi-FI" dirty="0"/>
+              <a:t>(</a:t>
+            </a:r>
+            <a:r>
+              <a:rPr lang="fi-FI" dirty="0" err="1"/>
+              <a:t>Something</a:t>
+            </a:r>
+            <a:r>
+              <a:rPr lang="fi-FI" dirty="0"/>
+              <a:t> </a:t>
+            </a:r>
+            <a:r>
+              <a:rPr lang="fi-FI" dirty="0" err="1"/>
+              <a:t>here</a:t>
+            </a:r>
+            <a:r>
+              <a:rPr lang="fi-FI" dirty="0"/>
+              <a:t>)</a:t>
+            </a:r>
+          </a:p>
+          <a:p>
+            <a:r>
+              <a:rPr lang="fi-FI" i="1" dirty="0"/>
+              <a:t>Video demo</a:t>
+            </a:r>
           </a:p>
         </p:txBody>
       </p:sp>
@@ -14629,7 +15180,7 @@
           <p:cNvPr id="4" name="Slide Number Placeholder 3">
             <a:extLst>
               <a:ext uri="{FF2B5EF4-FFF2-40B4-BE49-F238E27FC236}">
-                <a16:creationId xmlns:a16="http://schemas.microsoft.com/office/drawing/2014/main" id="{03BFA65C-1F08-47F3-AFBB-0A1A7187C590}"/>
+                <a16:creationId xmlns:a16="http://schemas.microsoft.com/office/drawing/2014/main" id="{1B8CD3D2-353B-42FF-9DAA-64138799091C}"/>
               </a:ext>
             </a:extLst>
           </p:cNvPr>
@@ -14661,7 +15212,7 @@
     </p:spTree>
     <p:extLst>
       <p:ext uri="{BB962C8B-B14F-4D97-AF65-F5344CB8AC3E}">
-        <p14:creationId xmlns:p14="http://schemas.microsoft.com/office/powerpoint/2010/main" val="4067781472"/>
+        <p14:creationId xmlns:p14="http://schemas.microsoft.com/office/powerpoint/2010/main" val="3804781030"/>
       </p:ext>
     </p:extLst>
   </p:cSld>
@@ -14693,7 +15244,7 @@
           <p:cNvPr id="2" name="Title 1">
             <a:extLst>
               <a:ext uri="{FF2B5EF4-FFF2-40B4-BE49-F238E27FC236}">
-                <a16:creationId xmlns:a16="http://schemas.microsoft.com/office/drawing/2014/main" id="{B2AEB1AE-3EB1-439B-955B-3120B3D1CB1E}"/>
+                <a16:creationId xmlns:a16="http://schemas.microsoft.com/office/drawing/2014/main" id="{AC2056CA-4783-4C24-AF36-A7138C82CEC9}"/>
               </a:ext>
             </a:extLst>
           </p:cNvPr>
@@ -14709,7 +15260,43 @@
           <a:bodyPr/>
           <a:lstStyle/>
           <a:p>
-            <a:endParaRPr lang="fi-FI"/>
+            <a:r>
+              <a:rPr lang="fi-FI" dirty="0" err="1"/>
+              <a:t>Determine</a:t>
+            </a:r>
+            <a:r>
+              <a:rPr lang="fi-FI" dirty="0"/>
+              <a:t> </a:t>
+            </a:r>
+            <a:r>
+              <a:rPr lang="fi-FI" dirty="0" err="1"/>
+              <a:t>energy</a:t>
+            </a:r>
+            <a:r>
+              <a:rPr lang="fi-FI" dirty="0"/>
+              <a:t> </a:t>
+            </a:r>
+            <a:r>
+              <a:rPr lang="fi-FI" dirty="0" err="1"/>
+              <a:t>based</a:t>
+            </a:r>
+            <a:r>
+              <a:rPr lang="fi-FI" dirty="0"/>
+              <a:t> on </a:t>
+            </a:r>
+            <a:r>
+              <a:rPr lang="fi-FI" dirty="0" err="1"/>
+              <a:t>cropped</a:t>
+            </a:r>
+            <a:r>
+              <a:rPr lang="fi-FI" dirty="0"/>
+              <a:t> </a:t>
+            </a:r>
+            <a:r>
+              <a:rPr lang="fi-FI" dirty="0" err="1"/>
+              <a:t>powermap</a:t>
+            </a:r>
+            <a:endParaRPr lang="fi-FI" dirty="0"/>
           </a:p>
         </p:txBody>
       </p:sp>
@@ -14718,7 +15305,7 @@
           <p:cNvPr id="3" name="Content Placeholder 2">
             <a:extLst>
               <a:ext uri="{FF2B5EF4-FFF2-40B4-BE49-F238E27FC236}">
-                <a16:creationId xmlns:a16="http://schemas.microsoft.com/office/drawing/2014/main" id="{7D028B6B-B35B-45E7-BE59-C1189483A277}"/>
+                <a16:creationId xmlns:a16="http://schemas.microsoft.com/office/drawing/2014/main" id="{44B6144D-DAAA-42DD-9B3F-0BF64997EAB4}"/>
               </a:ext>
             </a:extLst>
           </p:cNvPr>
@@ -14729,12 +15316,82 @@
             <p:ph idx="1"/>
           </p:nvPr>
         </p:nvSpPr>
-        <p:spPr/>
+        <p:spPr>
+          <a:xfrm>
+            <a:off x="410400" y="2352583"/>
+            <a:ext cx="10515600" cy="3706052"/>
+          </a:xfrm>
+        </p:spPr>
         <p:txBody>
           <a:bodyPr/>
           <a:lstStyle/>
           <a:p>
-            <a:endParaRPr lang="fi-FI"/>
+            <a:r>
+              <a:rPr lang="fi-FI" dirty="0"/>
+              <a:t>(</a:t>
+            </a:r>
+            <a:r>
+              <a:rPr lang="fi-FI" dirty="0" err="1"/>
+              <a:t>Something</a:t>
+            </a:r>
+            <a:r>
+              <a:rPr lang="fi-FI" dirty="0"/>
+              <a:t> </a:t>
+            </a:r>
+            <a:r>
+              <a:rPr lang="fi-FI" dirty="0" err="1"/>
+              <a:t>here</a:t>
+            </a:r>
+            <a:r>
+              <a:rPr lang="fi-FI" dirty="0"/>
+              <a:t>)</a:t>
+            </a:r>
+          </a:p>
+          <a:p>
+            <a:r>
+              <a:rPr lang="fi-FI" i="1" dirty="0"/>
+              <a:t>CSV </a:t>
+            </a:r>
+            <a:r>
+              <a:rPr lang="fi-FI" i="1" dirty="0" err="1"/>
+              <a:t>file</a:t>
+            </a:r>
+            <a:r>
+              <a:rPr lang="fi-FI" i="1" dirty="0"/>
+              <a:t> demo</a:t>
+            </a:r>
+          </a:p>
+          <a:p>
+            <a:pPr lvl="1"/>
+            <a:r>
+              <a:rPr lang="fi-FI" dirty="0" err="1"/>
+              <a:t>Coordinates</a:t>
+            </a:r>
+            <a:r>
+              <a:rPr lang="fi-FI" dirty="0"/>
+              <a:t> </a:t>
+            </a:r>
+            <a:r>
+              <a:rPr lang="fi-FI" dirty="0" err="1"/>
+              <a:t>converted</a:t>
+            </a:r>
+            <a:r>
+              <a:rPr lang="fi-FI" dirty="0"/>
+              <a:t> to </a:t>
+            </a:r>
+            <a:r>
+              <a:rPr lang="fi-FI" dirty="0" err="1"/>
+              <a:t>spherical</a:t>
+            </a:r>
+            <a:r>
+              <a:rPr lang="fi-FI" dirty="0"/>
+              <a:t> </a:t>
+            </a:r>
+            <a:r>
+              <a:rPr lang="fi-FI" dirty="0" err="1"/>
+              <a:t>coordinates</a:t>
+            </a:r>
+            <a:endParaRPr lang="fi-FI" dirty="0"/>
           </a:p>
         </p:txBody>
       </p:sp>
@@ -14743,7 +15400,7 @@
           <p:cNvPr id="4" name="Slide Number Placeholder 3">
             <a:extLst>
               <a:ext uri="{FF2B5EF4-FFF2-40B4-BE49-F238E27FC236}">
-                <a16:creationId xmlns:a16="http://schemas.microsoft.com/office/drawing/2014/main" id="{4ED7030C-2A97-49D1-B48E-DF4701A48851}"/>
+                <a16:creationId xmlns:a16="http://schemas.microsoft.com/office/drawing/2014/main" id="{03BFA65C-1F08-47F3-AFBB-0A1A7187C590}"/>
               </a:ext>
             </a:extLst>
           </p:cNvPr>
@@ -14775,7 +15432,7 @@
     </p:spTree>
     <p:extLst>
       <p:ext uri="{BB962C8B-B14F-4D97-AF65-F5344CB8AC3E}">
-        <p14:creationId xmlns:p14="http://schemas.microsoft.com/office/powerpoint/2010/main" val="464035261"/>
+        <p14:creationId xmlns:p14="http://schemas.microsoft.com/office/powerpoint/2010/main" val="4067781472"/>
       </p:ext>
     </p:extLst>
   </p:cSld>
@@ -14804,18 +15461,18 @@
       </p:grpSpPr>
       <p:sp>
         <p:nvSpPr>
-          <p:cNvPr id="2" name="Title 1">
-            <a:extLst>
-              <a:ext uri="{FF2B5EF4-FFF2-40B4-BE49-F238E27FC236}">
-                <a16:creationId xmlns:a16="http://schemas.microsoft.com/office/drawing/2014/main" id="{38E0B3CB-0ED7-4E5C-B99E-3DB8A1918847}"/>
-              </a:ext>
-            </a:extLst>
-          </p:cNvPr>
-          <p:cNvSpPr>
-            <a:spLocks noGrp="1"/>
-          </p:cNvSpPr>
-          <p:nvPr>
-            <p:ph type="title"/>
+          <p:cNvPr id="2" name="Otsikko 1">
+            <a:extLst>
+              <a:ext uri="{FF2B5EF4-FFF2-40B4-BE49-F238E27FC236}">
+                <a16:creationId xmlns:a16="http://schemas.microsoft.com/office/drawing/2014/main" id="{C9D29DCB-8672-4F13-926F-8A06186E3F5D}"/>
+              </a:ext>
+            </a:extLst>
+          </p:cNvPr>
+          <p:cNvSpPr>
+            <a:spLocks noGrp="1"/>
+          </p:cNvSpPr>
+          <p:nvPr>
+            <p:ph type="ctrTitle"/>
           </p:nvPr>
         </p:nvSpPr>
         <p:spPr/>
@@ -14823,24 +15480,27 @@
           <a:bodyPr/>
           <a:lstStyle/>
           <a:p>
-            <a:endParaRPr lang="fi-FI"/>
-          </a:p>
-        </p:txBody>
-      </p:sp>
-      <p:sp>
-        <p:nvSpPr>
-          <p:cNvPr id="3" name="Content Placeholder 2">
-            <a:extLst>
-              <a:ext uri="{FF2B5EF4-FFF2-40B4-BE49-F238E27FC236}">
-                <a16:creationId xmlns:a16="http://schemas.microsoft.com/office/drawing/2014/main" id="{9B000474-FDDA-4CB1-B29E-AD75D1FEF281}"/>
-              </a:ext>
-            </a:extLst>
-          </p:cNvPr>
-          <p:cNvSpPr>
-            <a:spLocks noGrp="1"/>
-          </p:cNvSpPr>
-          <p:nvPr>
-            <p:ph idx="1"/>
+            <a:r>
+              <a:rPr lang="en-GB" dirty="0"/>
+              <a:t>Pipeline version 2</a:t>
+            </a:r>
+          </a:p>
+        </p:txBody>
+      </p:sp>
+      <p:sp>
+        <p:nvSpPr>
+          <p:cNvPr id="3" name="Alaotsikko 2">
+            <a:extLst>
+              <a:ext uri="{FF2B5EF4-FFF2-40B4-BE49-F238E27FC236}">
+                <a16:creationId xmlns:a16="http://schemas.microsoft.com/office/drawing/2014/main" id="{B08725A3-CA23-4E94-9005-AAC1886FA951}"/>
+              </a:ext>
+            </a:extLst>
+          </p:cNvPr>
+          <p:cNvSpPr>
+            <a:spLocks noGrp="1"/>
+          </p:cNvSpPr>
+          <p:nvPr>
+            <p:ph type="subTitle" idx="1"/>
           </p:nvPr>
         </p:nvSpPr>
         <p:spPr/>
@@ -14848,16 +15508,16 @@
           <a:bodyPr/>
           <a:lstStyle/>
           <a:p>
-            <a:endParaRPr lang="fi-FI"/>
-          </a:p>
-        </p:txBody>
-      </p:sp>
-      <p:sp>
-        <p:nvSpPr>
-          <p:cNvPr id="4" name="Slide Number Placeholder 3">
-            <a:extLst>
-              <a:ext uri="{FF2B5EF4-FFF2-40B4-BE49-F238E27FC236}">
-                <a16:creationId xmlns:a16="http://schemas.microsoft.com/office/drawing/2014/main" id="{F7D3EFC1-C978-4FA8-991C-75290401B08F}"/>
+            <a:endParaRPr lang="en-GB"/>
+          </a:p>
+        </p:txBody>
+      </p:sp>
+      <p:sp>
+        <p:nvSpPr>
+          <p:cNvPr id="4" name="Dian numeron paikkamerkki 3">
+            <a:extLst>
+              <a:ext uri="{FF2B5EF4-FFF2-40B4-BE49-F238E27FC236}">
+                <a16:creationId xmlns:a16="http://schemas.microsoft.com/office/drawing/2014/main" id="{0243873F-4068-4663-BC2F-B440DBF3DD72}"/>
               </a:ext>
             </a:extLst>
           </p:cNvPr>
@@ -14889,7 +15549,7 @@
     </p:spTree>
     <p:extLst>
       <p:ext uri="{BB962C8B-B14F-4D97-AF65-F5344CB8AC3E}">
-        <p14:creationId xmlns:p14="http://schemas.microsoft.com/office/powerpoint/2010/main" val="2853988632"/>
+        <p14:creationId xmlns:p14="http://schemas.microsoft.com/office/powerpoint/2010/main" val="3846966233"/>
       </p:ext>
     </p:extLst>
   </p:cSld>
@@ -14921,7 +15581,7 @@
           <p:cNvPr id="2" name="Title 1">
             <a:extLst>
               <a:ext uri="{FF2B5EF4-FFF2-40B4-BE49-F238E27FC236}">
-                <a16:creationId xmlns:a16="http://schemas.microsoft.com/office/drawing/2014/main" id="{8668099D-2FB9-4C55-B465-E8A526D19632}"/>
+                <a16:creationId xmlns:a16="http://schemas.microsoft.com/office/drawing/2014/main" id="{B2AEB1AE-3EB1-439B-955B-3120B3D1CB1E}"/>
               </a:ext>
             </a:extLst>
           </p:cNvPr>
@@ -14938,29 +15598,13 @@
           <a:lstStyle/>
           <a:p>
             <a:r>
-              <a:rPr lang="en-GB" dirty="0">
-                <a:latin typeface="Arial"/>
-                <a:cs typeface="Arial"/>
-              </a:rPr>
+              <a:rPr lang="fi-FI" dirty="0" err="1"/>
+              <a:t>Beamforming</a:t>
+            </a:r>
+            <a:r>
+              <a:rPr lang="fi-FI" dirty="0"/>
               <a:t> </a:t>
             </a:r>
-            <a:r>
-              <a:rPr lang="en-US" dirty="0">
-                <a:latin typeface="Arial"/>
-                <a:cs typeface="Arial"/>
-              </a:rPr>
-              <a:t>Deep SORT</a:t>
-            </a:r>
-            <a:br>
-              <a:rPr lang="en-US" dirty="0">
-                <a:latin typeface="Arial"/>
-                <a:cs typeface="Arial"/>
-              </a:rPr>
-            </a:br>
-            <a:endParaRPr lang="en-US" dirty="0">
-              <a:latin typeface="Arial"/>
-              <a:cs typeface="Arial"/>
-            </a:endParaRPr>
           </a:p>
         </p:txBody>
       </p:sp>
@@ -14969,7 +15613,7 @@
           <p:cNvPr id="3" name="Content Placeholder 2">
             <a:extLst>
               <a:ext uri="{FF2B5EF4-FFF2-40B4-BE49-F238E27FC236}">
-                <a16:creationId xmlns:a16="http://schemas.microsoft.com/office/drawing/2014/main" id="{A26C880C-874F-4BE2-8686-58B461EFA3E7}"/>
+                <a16:creationId xmlns:a16="http://schemas.microsoft.com/office/drawing/2014/main" id="{7D028B6B-B35B-45E7-BE59-C1189483A277}"/>
               </a:ext>
             </a:extLst>
           </p:cNvPr>
@@ -14980,40 +15624,200 @@
             <p:ph idx="1"/>
           </p:nvPr>
         </p:nvSpPr>
-        <p:spPr>
-          <a:xfrm>
-            <a:off x="410399" y="1707297"/>
-            <a:ext cx="11286605" cy="4351338"/>
-          </a:xfrm>
-        </p:spPr>
-        <p:txBody>
-          <a:bodyPr vert="horz" lIns="91440" tIns="45720" rIns="91440" bIns="45720" rtlCol="0" anchor="t">
-            <a:noAutofit/>
-          </a:bodyPr>
+        <p:spPr/>
+        <p:txBody>
+          <a:bodyPr/>
           <a:lstStyle/>
           <a:p>
-            <a:pPr marL="571500" indent="-571500"/>
-            <a:r>
-              <a:rPr lang="en-US" sz="2800" dirty="0">
-                <a:ea typeface="+mn-lt"/>
-                <a:cs typeface="+mn-lt"/>
-              </a:rPr>
-              <a:t>Deep-Sort is a traditional single-hypothesis multi-target tracking method using recursive Kalman filtering and frame-by-frame data correlation.</a:t>
-            </a:r>
-          </a:p>
-          <a:p>
-            <a:pPr marL="571500" indent="-571500"/>
-            <a:r>
-              <a:rPr lang="en-US" sz="2800" dirty="0">
-                <a:ea typeface="+mn-lt"/>
-                <a:cs typeface="+mn-lt"/>
-              </a:rPr>
-              <a:t>Deep-Sort adopts the fusion metric that combining the distance of predicted position and the observed position in the Markov space and the cosine distance of the apparent feature between the bounding boxes in the Kalman filter.</a:t>
-            </a:r>
-            <a:endParaRPr lang="en-US" sz="2800" dirty="0">
-              <a:ea typeface="+mj-ea"/>
-              <a:cs typeface="Arial" panose="020B0604020202020204"/>
-            </a:endParaRPr>
+            <a:r>
+              <a:rPr lang="fi-FI" dirty="0" err="1"/>
+              <a:t>Beamforming</a:t>
+            </a:r>
+            <a:r>
+              <a:rPr lang="fi-FI" dirty="0"/>
+              <a:t> </a:t>
+            </a:r>
+            <a:r>
+              <a:rPr lang="fi-FI" dirty="0" err="1"/>
+              <a:t>can</a:t>
+            </a:r>
+            <a:r>
+              <a:rPr lang="fi-FI" dirty="0"/>
+              <a:t> </a:t>
+            </a:r>
+            <a:r>
+              <a:rPr lang="fi-FI" dirty="0" err="1"/>
+              <a:t>also</a:t>
+            </a:r>
+            <a:r>
+              <a:rPr lang="fi-FI" dirty="0"/>
+              <a:t> </a:t>
+            </a:r>
+            <a:r>
+              <a:rPr lang="fi-FI" dirty="0" err="1"/>
+              <a:t>be</a:t>
+            </a:r>
+            <a:r>
+              <a:rPr lang="fi-FI" dirty="0"/>
+              <a:t> </a:t>
+            </a:r>
+            <a:r>
+              <a:rPr lang="fi-FI" dirty="0" err="1"/>
+              <a:t>used</a:t>
+            </a:r>
+            <a:r>
+              <a:rPr lang="fi-FI" dirty="0"/>
+              <a:t> to </a:t>
+            </a:r>
+            <a:r>
+              <a:rPr lang="fi-FI" dirty="0" err="1"/>
+              <a:t>determine</a:t>
+            </a:r>
+            <a:r>
+              <a:rPr lang="fi-FI" dirty="0"/>
+              <a:t> </a:t>
+            </a:r>
+            <a:r>
+              <a:rPr lang="fi-FI" dirty="0" err="1"/>
+              <a:t>audio</a:t>
+            </a:r>
+            <a:r>
+              <a:rPr lang="fi-FI" dirty="0"/>
+              <a:t> </a:t>
+            </a:r>
+            <a:r>
+              <a:rPr lang="fi-FI" dirty="0" err="1"/>
+              <a:t>activity</a:t>
+            </a:r>
+            <a:endParaRPr lang="fi-FI" dirty="0"/>
+          </a:p>
+          <a:p>
+            <a:pPr lvl="1"/>
+            <a:r>
+              <a:rPr lang="fi-FI" dirty="0"/>
+              <a:t>”</a:t>
+            </a:r>
+            <a:r>
+              <a:rPr lang="fi-FI" dirty="0" err="1"/>
+              <a:t>Listens</a:t>
+            </a:r>
+            <a:r>
+              <a:rPr lang="fi-FI" dirty="0"/>
+              <a:t>” to a </a:t>
+            </a:r>
+            <a:r>
+              <a:rPr lang="fi-FI" dirty="0" err="1"/>
+              <a:t>pointed</a:t>
+            </a:r>
+            <a:r>
+              <a:rPr lang="fi-FI" dirty="0"/>
+              <a:t> </a:t>
+            </a:r>
+            <a:r>
+              <a:rPr lang="fi-FI" dirty="0" err="1"/>
+              <a:t>direction</a:t>
+            </a:r>
+            <a:endParaRPr lang="fi-FI" dirty="0"/>
+          </a:p>
+          <a:p>
+            <a:pPr lvl="1"/>
+            <a:r>
+              <a:rPr lang="fi-FI" dirty="0"/>
+              <a:t>How to </a:t>
+            </a:r>
+            <a:r>
+              <a:rPr lang="fi-FI" dirty="0" err="1"/>
+              <a:t>get</a:t>
+            </a:r>
+            <a:r>
+              <a:rPr lang="fi-FI" dirty="0"/>
+              <a:t> a </a:t>
+            </a:r>
+            <a:r>
+              <a:rPr lang="fi-FI" dirty="0" err="1"/>
+              <a:t>pointed</a:t>
+            </a:r>
+            <a:r>
+              <a:rPr lang="fi-FI" dirty="0"/>
+              <a:t> </a:t>
+            </a:r>
+            <a:r>
+              <a:rPr lang="fi-FI" dirty="0" err="1"/>
+              <a:t>direction</a:t>
+            </a:r>
+            <a:r>
+              <a:rPr lang="fi-FI" dirty="0"/>
+              <a:t>?</a:t>
+            </a:r>
+          </a:p>
+          <a:p>
+            <a:pPr marL="1128713" lvl="2" indent="-457200">
+              <a:buFont typeface="+mj-lt"/>
+              <a:buAutoNum type="arabicPeriod"/>
+            </a:pPr>
+            <a:r>
+              <a:rPr lang="fi-FI" dirty="0"/>
+              <a:t>Multi-</a:t>
+            </a:r>
+            <a:r>
+              <a:rPr lang="fi-FI" dirty="0" err="1"/>
+              <a:t>frame</a:t>
+            </a:r>
+            <a:r>
+              <a:rPr lang="fi-FI" dirty="0"/>
+              <a:t> (video) </a:t>
+            </a:r>
+            <a:r>
+              <a:rPr lang="fi-FI" dirty="0" err="1"/>
+              <a:t>audio</a:t>
+            </a:r>
+            <a:r>
+              <a:rPr lang="fi-FI" dirty="0"/>
+              <a:t> </a:t>
+            </a:r>
+            <a:r>
+              <a:rPr lang="fi-FI" dirty="0" err="1"/>
+              <a:t>segments</a:t>
+            </a:r>
+            <a:endParaRPr lang="fi-FI" dirty="0"/>
+          </a:p>
+          <a:p>
+            <a:pPr marL="1128713" lvl="2" indent="-457200">
+              <a:buFont typeface="+mj-lt"/>
+              <a:buAutoNum type="arabicPeriod"/>
+            </a:pPr>
+            <a:r>
+              <a:rPr lang="fi-FI" dirty="0" err="1"/>
+              <a:t>Frame-level</a:t>
+            </a:r>
+            <a:r>
+              <a:rPr lang="fi-FI" dirty="0"/>
+              <a:t> (video) </a:t>
+            </a:r>
+            <a:r>
+              <a:rPr lang="fi-FI" dirty="0" err="1"/>
+              <a:t>audio</a:t>
+            </a:r>
+            <a:r>
+              <a:rPr lang="fi-FI" dirty="0"/>
+              <a:t> </a:t>
+            </a:r>
+            <a:r>
+              <a:rPr lang="fi-FI" dirty="0" err="1"/>
+              <a:t>segments</a:t>
+            </a:r>
+            <a:endParaRPr lang="fi-FI" dirty="0"/>
+          </a:p>
+          <a:p>
+            <a:pPr marL="1128713" lvl="2" indent="-457200">
+              <a:buFont typeface="+mj-lt"/>
+              <a:buAutoNum type="arabicPeriod"/>
+            </a:pPr>
+            <a:r>
+              <a:rPr lang="fi-FI" dirty="0" err="1"/>
+              <a:t>DeepSORT</a:t>
+            </a:r>
+            <a:endParaRPr lang="fi-FI" dirty="0"/>
           </a:p>
         </p:txBody>
       </p:sp>
@@ -15022,7 +15826,7 @@
           <p:cNvPr id="4" name="Slide Number Placeholder 3">
             <a:extLst>
               <a:ext uri="{FF2B5EF4-FFF2-40B4-BE49-F238E27FC236}">
-                <a16:creationId xmlns:a16="http://schemas.microsoft.com/office/drawing/2014/main" id="{BE7E65FD-92F3-4B67-AB28-5D4DBC38BB45}"/>
+                <a16:creationId xmlns:a16="http://schemas.microsoft.com/office/drawing/2014/main" id="{4ED7030C-2A97-49D1-B48E-DF4701A48851}"/>
               </a:ext>
             </a:extLst>
           </p:cNvPr>
@@ -15054,7 +15858,7 @@
     </p:spTree>
     <p:extLst>
       <p:ext uri="{BB962C8B-B14F-4D97-AF65-F5344CB8AC3E}">
-        <p14:creationId xmlns:p14="http://schemas.microsoft.com/office/powerpoint/2010/main" val="1704128306"/>
+        <p14:creationId xmlns:p14="http://schemas.microsoft.com/office/powerpoint/2010/main" val="464035261"/>
       </p:ext>
     </p:extLst>
   </p:cSld>
@@ -15083,10 +15887,384 @@
       </p:grpSpPr>
       <p:sp>
         <p:nvSpPr>
+          <p:cNvPr id="2" name="Title 1">
+            <a:extLst>
+              <a:ext uri="{FF2B5EF4-FFF2-40B4-BE49-F238E27FC236}">
+                <a16:creationId xmlns:a16="http://schemas.microsoft.com/office/drawing/2014/main" id="{38E0B3CB-0ED7-4E5C-B99E-3DB8A1918847}"/>
+              </a:ext>
+            </a:extLst>
+          </p:cNvPr>
+          <p:cNvSpPr>
+            <a:spLocks noGrp="1"/>
+          </p:cNvSpPr>
+          <p:nvPr>
+            <p:ph type="title"/>
+          </p:nvPr>
+        </p:nvSpPr>
+        <p:spPr/>
+        <p:txBody>
+          <a:bodyPr/>
+          <a:lstStyle/>
+          <a:p>
+            <a:r>
+              <a:rPr lang="fi-FI" dirty="0"/>
+              <a:t>Multi-</a:t>
+            </a:r>
+            <a:r>
+              <a:rPr lang="fi-FI" dirty="0" err="1"/>
+              <a:t>frame</a:t>
+            </a:r>
+            <a:r>
+              <a:rPr lang="fi-FI" dirty="0"/>
+              <a:t> (video) </a:t>
+            </a:r>
+            <a:r>
+              <a:rPr lang="fi-FI" dirty="0" err="1"/>
+              <a:t>audio</a:t>
+            </a:r>
+            <a:r>
+              <a:rPr lang="fi-FI" dirty="0"/>
+              <a:t> </a:t>
+            </a:r>
+            <a:r>
+              <a:rPr lang="fi-FI" dirty="0" err="1"/>
+              <a:t>segments</a:t>
+            </a:r>
+            <a:br>
+              <a:rPr lang="fi-FI" dirty="0"/>
+            </a:br>
+            <a:endParaRPr lang="fi-FI" dirty="0"/>
+          </a:p>
+        </p:txBody>
+      </p:sp>
+      <p:sp>
+        <p:nvSpPr>
+          <p:cNvPr id="3" name="Content Placeholder 2">
+            <a:extLst>
+              <a:ext uri="{FF2B5EF4-FFF2-40B4-BE49-F238E27FC236}">
+                <a16:creationId xmlns:a16="http://schemas.microsoft.com/office/drawing/2014/main" id="{9B000474-FDDA-4CB1-B29E-AD75D1FEF281}"/>
+              </a:ext>
+            </a:extLst>
+          </p:cNvPr>
+          <p:cNvSpPr>
+            <a:spLocks noGrp="1"/>
+          </p:cNvSpPr>
+          <p:nvPr>
+            <p:ph idx="1"/>
+          </p:nvPr>
+        </p:nvSpPr>
+        <p:spPr/>
+        <p:txBody>
+          <a:bodyPr/>
+          <a:lstStyle/>
+          <a:p>
+            <a:r>
+              <a:rPr lang="fi-FI" dirty="0" err="1"/>
+              <a:t>We</a:t>
+            </a:r>
+            <a:r>
+              <a:rPr lang="fi-FI" dirty="0"/>
+              <a:t> </a:t>
+            </a:r>
+            <a:r>
+              <a:rPr lang="fi-FI" dirty="0" err="1"/>
+              <a:t>want</a:t>
+            </a:r>
+            <a:r>
+              <a:rPr lang="fi-FI" dirty="0"/>
+              <a:t> to </a:t>
+            </a:r>
+            <a:r>
+              <a:rPr lang="fi-FI" dirty="0" err="1"/>
+              <a:t>find</a:t>
+            </a:r>
+            <a:r>
+              <a:rPr lang="fi-FI" dirty="0"/>
+              <a:t> </a:t>
+            </a:r>
+            <a:r>
+              <a:rPr lang="fi-FI" dirty="0" err="1"/>
+              <a:t>the</a:t>
+            </a:r>
+            <a:r>
+              <a:rPr lang="fi-FI" dirty="0"/>
+              <a:t> </a:t>
+            </a:r>
+            <a:r>
+              <a:rPr lang="fi-FI" dirty="0" err="1"/>
+              <a:t>temporal</a:t>
+            </a:r>
+            <a:r>
+              <a:rPr lang="fi-FI" dirty="0"/>
+              <a:t> </a:t>
+            </a:r>
+            <a:r>
+              <a:rPr lang="fi-FI" dirty="0" err="1"/>
+              <a:t>trajectories</a:t>
+            </a:r>
+            <a:r>
+              <a:rPr lang="fi-FI" dirty="0"/>
+              <a:t> of </a:t>
+            </a:r>
+            <a:r>
+              <a:rPr lang="fi-FI" dirty="0" err="1"/>
+              <a:t>visual</a:t>
+            </a:r>
+            <a:r>
+              <a:rPr lang="fi-FI" dirty="0"/>
+              <a:t> </a:t>
+            </a:r>
+            <a:r>
+              <a:rPr lang="fi-FI" dirty="0" err="1"/>
+              <a:t>objects</a:t>
+            </a:r>
+            <a:r>
+              <a:rPr lang="fi-FI" dirty="0"/>
+              <a:t> (</a:t>
+            </a:r>
+            <a:r>
+              <a:rPr lang="fi-FI" dirty="0" err="1"/>
+              <a:t>from</a:t>
+            </a:r>
+            <a:r>
+              <a:rPr lang="fi-FI" dirty="0"/>
+              <a:t> </a:t>
+            </a:r>
+            <a:r>
+              <a:rPr lang="fi-FI" dirty="0" err="1"/>
+              <a:t>the</a:t>
+            </a:r>
+            <a:r>
+              <a:rPr lang="fi-FI" dirty="0"/>
+              <a:t> video </a:t>
+            </a:r>
+            <a:r>
+              <a:rPr lang="fi-FI" dirty="0" err="1"/>
+              <a:t>tracker</a:t>
+            </a:r>
+            <a:r>
+              <a:rPr lang="fi-FI" dirty="0"/>
+              <a:t>)</a:t>
+            </a:r>
+          </a:p>
+          <a:p>
+            <a:r>
+              <a:rPr lang="fi-FI" b="1" dirty="0" err="1"/>
+              <a:t>Problem</a:t>
+            </a:r>
+            <a:r>
+              <a:rPr lang="fi-FI" dirty="0"/>
+              <a:t>: </a:t>
+            </a:r>
+            <a:r>
+              <a:rPr lang="fi-FI" dirty="0" err="1"/>
+              <a:t>how</a:t>
+            </a:r>
+            <a:r>
+              <a:rPr lang="fi-FI" dirty="0"/>
+              <a:t> to </a:t>
+            </a:r>
+            <a:r>
+              <a:rPr lang="fi-FI" dirty="0" err="1"/>
+              <a:t>find</a:t>
+            </a:r>
+            <a:r>
+              <a:rPr lang="fi-FI" dirty="0"/>
+              <a:t> </a:t>
+            </a:r>
+            <a:r>
+              <a:rPr lang="fi-FI" dirty="0" err="1"/>
+              <a:t>correspondences</a:t>
+            </a:r>
+            <a:r>
+              <a:rPr lang="fi-FI" dirty="0"/>
+              <a:t> </a:t>
+            </a:r>
+            <a:r>
+              <a:rPr lang="fi-FI" dirty="0" err="1"/>
+              <a:t>between</a:t>
+            </a:r>
+            <a:r>
+              <a:rPr lang="fi-FI" dirty="0"/>
+              <a:t> </a:t>
+            </a:r>
+            <a:r>
+              <a:rPr lang="fi-FI" dirty="0" err="1"/>
+              <a:t>objects</a:t>
+            </a:r>
+            <a:r>
+              <a:rPr lang="fi-FI" dirty="0"/>
+              <a:t> in </a:t>
+            </a:r>
+            <a:r>
+              <a:rPr lang="fi-FI" dirty="0" err="1"/>
+              <a:t>consecutive</a:t>
+            </a:r>
+            <a:r>
+              <a:rPr lang="fi-FI" dirty="0"/>
+              <a:t> </a:t>
+            </a:r>
+            <a:r>
+              <a:rPr lang="fi-FI" dirty="0" err="1"/>
+              <a:t>frames</a:t>
+            </a:r>
+            <a:r>
+              <a:rPr lang="fi-FI" dirty="0"/>
+              <a:t>?</a:t>
+            </a:r>
+          </a:p>
+          <a:p>
+            <a:pPr marL="828675" lvl="1" indent="-514350">
+              <a:buFont typeface="+mj-lt"/>
+              <a:buAutoNum type="arabicPeriod"/>
+            </a:pPr>
+            <a:r>
+              <a:rPr lang="fi-FI" dirty="0" err="1"/>
+              <a:t>Have</a:t>
+            </a:r>
+            <a:r>
+              <a:rPr lang="fi-FI" dirty="0"/>
+              <a:t> </a:t>
+            </a:r>
+            <a:r>
+              <a:rPr lang="fi-FI" dirty="0" err="1"/>
+              <a:t>only</a:t>
+            </a:r>
+            <a:r>
+              <a:rPr lang="fi-FI" dirty="0"/>
+              <a:t> </a:t>
+            </a:r>
+            <a:r>
+              <a:rPr lang="fi-FI" dirty="0" err="1"/>
+              <a:t>one</a:t>
+            </a:r>
+            <a:r>
+              <a:rPr lang="fi-FI" dirty="0"/>
+              <a:t> </a:t>
+            </a:r>
+            <a:r>
+              <a:rPr lang="fi-FI" dirty="0" err="1"/>
+              <a:t>object</a:t>
+            </a:r>
+            <a:r>
+              <a:rPr lang="fi-FI" dirty="0"/>
+              <a:t> </a:t>
+            </a:r>
+            <a:r>
+              <a:rPr lang="fi-FI" dirty="0" err="1"/>
+              <a:t>present</a:t>
+            </a:r>
+            <a:r>
+              <a:rPr lang="fi-FI" dirty="0"/>
+              <a:t> in video (</a:t>
+            </a:r>
+            <a:r>
+              <a:rPr lang="fi-FI" dirty="0" err="1"/>
+              <a:t>current</a:t>
+            </a:r>
+            <a:r>
+              <a:rPr lang="fi-FI" dirty="0"/>
+              <a:t> </a:t>
+            </a:r>
+            <a:r>
+              <a:rPr lang="fi-FI" dirty="0" err="1"/>
+              <a:t>implementation</a:t>
+            </a:r>
+            <a:r>
+              <a:rPr lang="fi-FI" dirty="0"/>
+              <a:t>)</a:t>
+            </a:r>
+          </a:p>
+          <a:p>
+            <a:pPr marL="828675" lvl="1" indent="-514350">
+              <a:buFont typeface="+mj-lt"/>
+              <a:buAutoNum type="arabicPeriod"/>
+            </a:pPr>
+            <a:r>
+              <a:rPr lang="fi-FI" dirty="0"/>
+              <a:t>Some </a:t>
+            </a:r>
+            <a:r>
+              <a:rPr lang="fi-FI" dirty="0" err="1"/>
+              <a:t>more</a:t>
+            </a:r>
+            <a:r>
+              <a:rPr lang="fi-FI" dirty="0"/>
+              <a:t> </a:t>
+            </a:r>
+            <a:r>
+              <a:rPr lang="fi-FI" dirty="0" err="1"/>
+              <a:t>advanced</a:t>
+            </a:r>
+            <a:r>
+              <a:rPr lang="fi-FI" dirty="0"/>
+              <a:t> </a:t>
+            </a:r>
+            <a:r>
+              <a:rPr lang="fi-FI" dirty="0" err="1"/>
+              <a:t>method</a:t>
+            </a:r>
+            <a:r>
+              <a:rPr lang="fi-FI" dirty="0"/>
+              <a:t>, </a:t>
+            </a:r>
+            <a:r>
+              <a:rPr lang="fi-FI" dirty="0" err="1"/>
+              <a:t>e.g</a:t>
+            </a:r>
+            <a:r>
+              <a:rPr lang="fi-FI" dirty="0"/>
+              <a:t>. a video </a:t>
+            </a:r>
+            <a:r>
+              <a:rPr lang="fi-FI" dirty="0" err="1"/>
+              <a:t>object</a:t>
+            </a:r>
+            <a:r>
+              <a:rPr lang="fi-FI" dirty="0"/>
+              <a:t> </a:t>
+            </a:r>
+            <a:r>
+              <a:rPr lang="fi-FI" dirty="0" err="1"/>
+              <a:t>tracker</a:t>
+            </a:r>
+            <a:endParaRPr lang="fi-FI" dirty="0"/>
+          </a:p>
+          <a:p>
+            <a:pPr marL="828675" lvl="1" indent="-514350">
+              <a:buFont typeface="+mj-lt"/>
+              <a:buAutoNum type="arabicPeriod"/>
+            </a:pPr>
+            <a:r>
+              <a:rPr lang="fi-FI" u="sng" dirty="0" err="1"/>
+              <a:t>Handle</a:t>
+            </a:r>
+            <a:r>
+              <a:rPr lang="fi-FI" u="sng" dirty="0"/>
+              <a:t> </a:t>
+            </a:r>
+            <a:r>
+              <a:rPr lang="fi-FI" u="sng" dirty="0" err="1"/>
+              <a:t>everything</a:t>
+            </a:r>
+            <a:r>
+              <a:rPr lang="fi-FI" u="sng" dirty="0"/>
+              <a:t> on </a:t>
+            </a:r>
+            <a:r>
+              <a:rPr lang="fi-FI" u="sng" dirty="0" err="1"/>
+              <a:t>frame-level</a:t>
+            </a:r>
+            <a:endParaRPr lang="fi-FI" u="sng" dirty="0"/>
+          </a:p>
+        </p:txBody>
+      </p:sp>
+      <p:sp>
+        <p:nvSpPr>
           <p:cNvPr id="4" name="Slide Number Placeholder 3">
             <a:extLst>
               <a:ext uri="{FF2B5EF4-FFF2-40B4-BE49-F238E27FC236}">
-                <a16:creationId xmlns:a16="http://schemas.microsoft.com/office/drawing/2014/main" id="{BE7E65FD-92F3-4B67-AB28-5D4DBC38BB45}"/>
+                <a16:creationId xmlns:a16="http://schemas.microsoft.com/office/drawing/2014/main" id="{F7D3EFC1-C978-4FA8-991C-75290401B08F}"/>
               </a:ext>
             </a:extLst>
           </p:cNvPr>
@@ -15115,99 +16293,10 @@
           </a:p>
         </p:txBody>
       </p:sp>
-      <p:pic>
-        <p:nvPicPr>
-          <p:cNvPr id="15" name="Picture 15" descr="Diagram&#10;&#10;Description automatically generated">
-            <a:extLst>
-              <a:ext uri="{FF2B5EF4-FFF2-40B4-BE49-F238E27FC236}">
-                <a16:creationId xmlns:a16="http://schemas.microsoft.com/office/drawing/2014/main" id="{8A743F83-B233-451D-BAF3-B11EC68643B3}"/>
-              </a:ext>
-            </a:extLst>
-          </p:cNvPr>
-          <p:cNvPicPr>
-            <a:picLocks noGrp="1" noChangeAspect="1"/>
-          </p:cNvPicPr>
-          <p:nvPr>
-            <p:ph idx="1"/>
-          </p:nvPr>
-        </p:nvPicPr>
-        <p:blipFill>
-          <a:blip r:embed="rId2"/>
-          <a:stretch>
-            <a:fillRect/>
-          </a:stretch>
-        </p:blipFill>
-        <p:spPr>
-          <a:xfrm>
-            <a:off x="410400" y="1480008"/>
-            <a:ext cx="10515600" cy="3945719"/>
-          </a:xfrm>
-        </p:spPr>
-      </p:pic>
-      <p:sp>
-        <p:nvSpPr>
-          <p:cNvPr id="19" name="Title 1">
-            <a:extLst>
-              <a:ext uri="{FF2B5EF4-FFF2-40B4-BE49-F238E27FC236}">
-                <a16:creationId xmlns:a16="http://schemas.microsoft.com/office/drawing/2014/main" id="{FB8FBD9E-5734-4F3A-A6C9-9C9B019246DD}"/>
-              </a:ext>
-            </a:extLst>
-          </p:cNvPr>
-          <p:cNvSpPr txBox="1">
-            <a:spLocks/>
-          </p:cNvSpPr>
-          <p:nvPr/>
-        </p:nvSpPr>
-        <p:spPr>
-          <a:xfrm>
-            <a:off x="835969" y="5679255"/>
-            <a:ext cx="10515600" cy="645616"/>
-          </a:xfrm>
-          <a:prstGeom prst="rect">
-            <a:avLst/>
-          </a:prstGeom>
-        </p:spPr>
-        <p:txBody>
-          <a:bodyPr vert="horz" lIns="91440" tIns="45720" rIns="91440" bIns="45720" rtlCol="0" anchor="t" anchorCtr="0">
-            <a:noAutofit/>
-          </a:bodyPr>
-          <a:lstStyle>
-            <a:lvl1pPr algn="l" defTabSz="914400" rtl="0" eaLnBrk="1" latinLnBrk="0" hangingPunct="1">
-              <a:lnSpc>
-                <a:spcPct val="90000"/>
-              </a:lnSpc>
-              <a:spcBef>
-                <a:spcPct val="0"/>
-              </a:spcBef>
-              <a:buNone/>
-              <a:defRPr sz="4000" b="1" i="0" kern="1200">
-                <a:solidFill>
-                  <a:srgbClr val="4E008E"/>
-                </a:solidFill>
-                <a:latin typeface="Arial" panose="020B0604020202020204" pitchFamily="34" charset="0"/>
-                <a:ea typeface="+mj-ea"/>
-                <a:cs typeface="Arial" panose="020B0604020202020204" pitchFamily="34" charset="0"/>
-              </a:defRPr>
-            </a:lvl1pPr>
-          </a:lstStyle>
-          <a:p>
-            <a:r>
-              <a:rPr lang="en-US" sz="2400" b="0" dirty="0">
-                <a:solidFill>
-                  <a:schemeClr val="tx1"/>
-                </a:solidFill>
-                <a:latin typeface="Arial"/>
-                <a:cs typeface="Arial"/>
-              </a:rPr>
-              <a:t>Figure : The workflow of real-time detection and tracking [1]</a:t>
-            </a:r>
-          </a:p>
-        </p:txBody>
-      </p:sp>
     </p:spTree>
     <p:extLst>
       <p:ext uri="{BB962C8B-B14F-4D97-AF65-F5344CB8AC3E}">
-        <p14:creationId xmlns:p14="http://schemas.microsoft.com/office/powerpoint/2010/main" val="1588009974"/>
+        <p14:creationId xmlns:p14="http://schemas.microsoft.com/office/powerpoint/2010/main" val="2853988632"/>
       </p:ext>
     </p:extLst>
   </p:cSld>
@@ -15236,10 +16325,10 @@
       </p:grpSpPr>
       <p:sp>
         <p:nvSpPr>
-          <p:cNvPr id="2" name="Title 1">
-            <a:extLst>
-              <a:ext uri="{FF2B5EF4-FFF2-40B4-BE49-F238E27FC236}">
-                <a16:creationId xmlns:a16="http://schemas.microsoft.com/office/drawing/2014/main" id="{8668099D-2FB9-4C55-B465-E8A526D19632}"/>
+          <p:cNvPr id="2" name="Otsikko 1">
+            <a:extLst>
+              <a:ext uri="{FF2B5EF4-FFF2-40B4-BE49-F238E27FC236}">
+                <a16:creationId xmlns:a16="http://schemas.microsoft.com/office/drawing/2014/main" id="{B54A6B2C-9A09-4114-874B-1D941F806F15}"/>
               </a:ext>
             </a:extLst>
           </p:cNvPr>
@@ -15250,296 +16339,161 @@
             <p:ph type="title"/>
           </p:nvPr>
         </p:nvSpPr>
-        <p:spPr>
-          <a:xfrm>
-            <a:off x="410400" y="916517"/>
-            <a:ext cx="10650635" cy="649288"/>
-          </a:xfrm>
-        </p:spPr>
-        <p:txBody>
-          <a:bodyPr anchor="t">
-            <a:normAutofit/>
-          </a:bodyPr>
+        <p:spPr/>
+        <p:txBody>
+          <a:bodyPr/>
           <a:lstStyle/>
           <a:p>
-            <a:endParaRPr lang="en-US" dirty="0"/>
-          </a:p>
-        </p:txBody>
-      </p:sp>
-      <p:sp>
-        <p:nvSpPr>
-          <p:cNvPr id="5" name="Content Placeholder 4">
-            <a:extLst>
-              <a:ext uri="{FF2B5EF4-FFF2-40B4-BE49-F238E27FC236}">
-                <a16:creationId xmlns:a16="http://schemas.microsoft.com/office/drawing/2014/main" id="{39306DE6-A2B4-4040-ABD5-3BCA767D66B3}"/>
-              </a:ext>
-            </a:extLst>
-          </p:cNvPr>
-          <p:cNvSpPr>
-            <a:spLocks noGrp="1"/>
-          </p:cNvSpPr>
-          <p:nvPr>
-            <p:ph sz="half" idx="2"/>
-          </p:nvPr>
-        </p:nvSpPr>
-        <p:spPr>
-          <a:xfrm>
-            <a:off x="464829" y="4618264"/>
-            <a:ext cx="10099901" cy="1865314"/>
-          </a:xfrm>
-        </p:spPr>
-        <p:txBody>
-          <a:bodyPr vert="horz" lIns="91440" tIns="45720" rIns="91440" bIns="45720" rtlCol="0" anchor="t">
-            <a:normAutofit fontScale="92500" lnSpcReduction="10000"/>
-          </a:bodyPr>
+            <a:r>
+              <a:rPr lang="fi-FI" dirty="0" err="1"/>
+              <a:t>Frame-level</a:t>
+            </a:r>
+            <a:r>
+              <a:rPr lang="fi-FI" dirty="0"/>
+              <a:t> (video) </a:t>
+            </a:r>
+            <a:r>
+              <a:rPr lang="fi-FI" dirty="0" err="1"/>
+              <a:t>audio</a:t>
+            </a:r>
+            <a:r>
+              <a:rPr lang="fi-FI" dirty="0"/>
+              <a:t> </a:t>
+            </a:r>
+            <a:r>
+              <a:rPr lang="fi-FI" dirty="0" err="1"/>
+              <a:t>segments</a:t>
+            </a:r>
+            <a:br>
+              <a:rPr lang="fi-FI" dirty="0"/>
+            </a:br>
+            <a:endParaRPr lang="en-GB" dirty="0"/>
+          </a:p>
+        </p:txBody>
+      </p:sp>
+      <p:sp>
+        <p:nvSpPr>
+          <p:cNvPr id="3" name="Sisällön paikkamerkki 2">
+            <a:extLst>
+              <a:ext uri="{FF2B5EF4-FFF2-40B4-BE49-F238E27FC236}">
+                <a16:creationId xmlns:a16="http://schemas.microsoft.com/office/drawing/2014/main" id="{ED991E6B-FF3E-4B86-B117-40CB9A586D2F}"/>
+              </a:ext>
+            </a:extLst>
+          </p:cNvPr>
+          <p:cNvSpPr>
+            <a:spLocks noGrp="1"/>
+          </p:cNvSpPr>
+          <p:nvPr>
+            <p:ph idx="1"/>
+          </p:nvPr>
+        </p:nvSpPr>
+        <p:spPr/>
+        <p:txBody>
+          <a:bodyPr/>
           <a:lstStyle/>
           <a:p>
-            <a:pPr>
-              <a:spcBef>
-                <a:spcPct val="0"/>
-              </a:spcBef>
-              <a:spcAft>
-                <a:spcPts val="600"/>
-              </a:spcAft>
+            <a:r>
+              <a:rPr lang="en-GB" dirty="0"/>
+              <a:t>Basic idea:</a:t>
+            </a:r>
+          </a:p>
+          <a:p>
+            <a:pPr marL="828675" lvl="1" indent="-514350">
+              <a:buFont typeface="+mj-lt"/>
+              <a:buAutoNum type="arabicPeriod"/>
             </a:pPr>
             <a:r>
-              <a:rPr lang="en-US" dirty="0"/>
-              <a:t>Input: {image, patches, image pyramid}</a:t>
-            </a:r>
-          </a:p>
-          <a:p>
-            <a:pPr>
-              <a:spcBef>
-                <a:spcPct val="0"/>
-              </a:spcBef>
-              <a:spcAft>
-                <a:spcPts val="600"/>
-              </a:spcAft>
+              <a:rPr lang="en-GB" dirty="0"/>
+              <a:t>For each frame:</a:t>
+            </a:r>
+          </a:p>
+          <a:p>
+            <a:pPr marL="1144588" lvl="2" indent="-514350">
+              <a:buFont typeface="+mj-lt"/>
+              <a:buAutoNum type="arabicPeriod"/>
             </a:pPr>
             <a:r>
-              <a:rPr lang="en-US" dirty="0"/>
-              <a:t>Backbone: {VGG16, ResNet50, ResNeXt-101, Darknet53}</a:t>
-            </a:r>
-            <a:endParaRPr lang="en-US" dirty="0">
-              <a:cs typeface="Arial"/>
-            </a:endParaRPr>
-          </a:p>
-          <a:p>
-            <a:pPr>
-              <a:spcBef>
-                <a:spcPct val="0"/>
-              </a:spcBef>
-              <a:spcAft>
-                <a:spcPts val="600"/>
-              </a:spcAft>
+              <a:rPr lang="en-GB" dirty="0"/>
+              <a:t>Take the 100-ms audio segment corresponding to the video frame (video at 10 fps)</a:t>
+            </a:r>
+          </a:p>
+          <a:p>
+            <a:pPr marL="1144588" lvl="2" indent="-514350">
+              <a:buFont typeface="+mj-lt"/>
+              <a:buAutoNum type="arabicPeriod"/>
             </a:pPr>
             <a:r>
-              <a:rPr lang="en-US" dirty="0">
-                <a:cs typeface="Arial"/>
-              </a:rPr>
-              <a:t>Neck: </a:t>
-            </a:r>
-          </a:p>
-          <a:p>
-            <a:pPr>
-              <a:spcBef>
-                <a:spcPct val="0"/>
-              </a:spcBef>
-              <a:spcAft>
-                <a:spcPts val="600"/>
-              </a:spcAft>
+              <a:rPr lang="en-GB" dirty="0"/>
+              <a:t>List all detected objects within the frame</a:t>
+            </a:r>
+          </a:p>
+          <a:p>
+            <a:pPr marL="1144588" lvl="2" indent="-514350">
+              <a:buFont typeface="+mj-lt"/>
+              <a:buAutoNum type="arabicPeriod"/>
             </a:pPr>
-            <a:r>
-              <a:rPr lang="en-US" dirty="0">
-                <a:cs typeface="Arial"/>
-              </a:rPr>
-              <a:t>Head:</a:t>
-            </a:r>
-          </a:p>
-          <a:p>
-            <a:pPr lvl="1">
-              <a:spcBef>
-                <a:spcPct val="0"/>
-              </a:spcBef>
-              <a:spcAft>
-                <a:spcPts val="600"/>
-              </a:spcAft>
-              <a:buFont typeface="Wingdings" panose="020B0604020202020204" pitchFamily="34" charset="0"/>
-              <a:buChar char="Ø"/>
+            <a:endParaRPr lang="en-GB" dirty="0"/>
+          </a:p>
+          <a:p>
+            <a:pPr marL="828675" lvl="1" indent="-514350">
+              <a:buFont typeface="+mj-lt"/>
+              <a:buAutoNum type="arabicPeriod"/>
             </a:pPr>
             <a:r>
-              <a:rPr lang="en-US" dirty="0">
-                <a:cs typeface="Arial"/>
-              </a:rPr>
-              <a:t>Dense Prediction: {RPN, YOLO, SSD, Retina-Net, FCOS}</a:t>
-            </a:r>
-          </a:p>
-          <a:p>
-            <a:pPr lvl="1">
-              <a:spcBef>
-                <a:spcPct val="0"/>
-              </a:spcBef>
-              <a:spcAft>
-                <a:spcPts val="600"/>
-              </a:spcAft>
-              <a:buFont typeface="Wingdings" panose="020B0604020202020204" pitchFamily="34" charset="0"/>
-              <a:buChar char="Ø"/>
+              <a:rPr lang="en-GB" dirty="0"/>
+              <a:t>For each object in a frame, give the bounding box </a:t>
+            </a:r>
+            <a:r>
+              <a:rPr lang="en-GB" dirty="0" err="1"/>
+              <a:t>center</a:t>
+            </a:r>
+            <a:r>
+              <a:rPr lang="en-GB" dirty="0"/>
+              <a:t> coordinates (azimuth, elevation) to </a:t>
+            </a:r>
+            <a:r>
+              <a:rPr lang="en-GB"/>
+              <a:t>the beamformer</a:t>
+            </a:r>
+            <a:endParaRPr lang="en-GB" dirty="0"/>
+          </a:p>
+          <a:p>
+            <a:pPr marL="828675" lvl="1" indent="-514350">
+              <a:buFont typeface="+mj-lt"/>
+              <a:buAutoNum type="arabicPeriod"/>
             </a:pPr>
-            <a:r>
-              <a:rPr lang="en-US" dirty="0">
-                <a:cs typeface="Arial"/>
-              </a:rPr>
-              <a:t>Sparse Prediction: {Faster R-CNN, R-FCN} </a:t>
-            </a:r>
-            <a:r>
-              <a:rPr lang="en-US" dirty="0">
-                <a:ea typeface="+mn-lt"/>
-                <a:cs typeface="+mn-lt"/>
-              </a:rPr>
-              <a:t>[2]</a:t>
-            </a:r>
-          </a:p>
-        </p:txBody>
-      </p:sp>
-      <p:sp>
-        <p:nvSpPr>
-          <p:cNvPr id="19" name="Title 1">
-            <a:extLst>
-              <a:ext uri="{FF2B5EF4-FFF2-40B4-BE49-F238E27FC236}">
-                <a16:creationId xmlns:a16="http://schemas.microsoft.com/office/drawing/2014/main" id="{FB8FBD9E-5734-4F3A-A6C9-9C9B019246DD}"/>
-              </a:ext>
-            </a:extLst>
-          </p:cNvPr>
-          <p:cNvSpPr txBox="1">
-            <a:spLocks/>
-          </p:cNvSpPr>
-          <p:nvPr/>
-        </p:nvSpPr>
-        <p:spPr>
-          <a:xfrm>
-            <a:off x="1157287" y="3626985"/>
-            <a:ext cx="9265330" cy="587148"/>
-          </a:xfrm>
-          <a:prstGeom prst="rect">
-            <a:avLst/>
-          </a:prstGeom>
-        </p:spPr>
-        <p:txBody>
-          <a:bodyPr vert="horz" lIns="91440" tIns="45720" rIns="91440" bIns="45720" rtlCol="0" anchor="b" anchorCtr="0">
-            <a:normAutofit/>
-          </a:bodyPr>
-          <a:lstStyle>
-            <a:lvl1pPr algn="l" defTabSz="914400" rtl="0" eaLnBrk="1" latinLnBrk="0" hangingPunct="1">
-              <a:lnSpc>
-                <a:spcPct val="90000"/>
-              </a:lnSpc>
-              <a:spcBef>
-                <a:spcPct val="0"/>
-              </a:spcBef>
-              <a:buNone/>
-              <a:defRPr sz="4000" b="1" i="0" kern="1200">
-                <a:solidFill>
-                  <a:srgbClr val="4E008E"/>
-                </a:solidFill>
-                <a:latin typeface="Arial" panose="020B0604020202020204" pitchFamily="34" charset="0"/>
-                <a:ea typeface="+mj-ea"/>
-                <a:cs typeface="Arial" panose="020B0604020202020204" pitchFamily="34" charset="0"/>
-              </a:defRPr>
-            </a:lvl1pPr>
-          </a:lstStyle>
-          <a:p>
-            <a:pPr>
-              <a:spcAft>
-                <a:spcPts val="600"/>
-              </a:spcAft>
-            </a:pPr>
-            <a:r>
-              <a:rPr lang="en-US" sz="2400" b="0" dirty="0">
-                <a:solidFill>
-                  <a:schemeClr val="tx1"/>
-                </a:solidFill>
-                <a:latin typeface="Arial"/>
-                <a:cs typeface="Arial"/>
-              </a:rPr>
-              <a:t>Figure : Architecture of object detection of YOLOv4 [2]</a:t>
-            </a:r>
-          </a:p>
-        </p:txBody>
-      </p:sp>
-      <p:pic>
-        <p:nvPicPr>
-          <p:cNvPr id="6" name="Picture 6" descr="A picture containing diagram&#10;&#10;Description automatically generated">
-            <a:extLst>
-              <a:ext uri="{FF2B5EF4-FFF2-40B4-BE49-F238E27FC236}">
-                <a16:creationId xmlns:a16="http://schemas.microsoft.com/office/drawing/2014/main" id="{7698726F-F063-4130-8A6E-757FFA95E467}"/>
-              </a:ext>
-            </a:extLst>
-          </p:cNvPr>
-          <p:cNvPicPr>
-            <a:picLocks noGrp="1" noChangeAspect="1"/>
-          </p:cNvPicPr>
-          <p:nvPr>
-            <p:ph sz="quarter" idx="4"/>
-          </p:nvPr>
-        </p:nvPicPr>
-        <p:blipFill>
-          <a:blip r:embed="rId2"/>
-          <a:stretch>
-            <a:fillRect/>
-          </a:stretch>
-        </p:blipFill>
-        <p:spPr>
-          <a:xfrm>
-            <a:off x="1157287" y="1574854"/>
-            <a:ext cx="9406845" cy="2182706"/>
-          </a:xfrm>
-          <a:noFill/>
-        </p:spPr>
-      </p:pic>
-      <p:sp>
-        <p:nvSpPr>
-          <p:cNvPr id="4" name="Slide Number Placeholder 3">
-            <a:extLst>
-              <a:ext uri="{FF2B5EF4-FFF2-40B4-BE49-F238E27FC236}">
-                <a16:creationId xmlns:a16="http://schemas.microsoft.com/office/drawing/2014/main" id="{BE7E65FD-92F3-4B67-AB28-5D4DBC38BB45}"/>
-              </a:ext>
-            </a:extLst>
-          </p:cNvPr>
-          <p:cNvSpPr>
-            <a:spLocks noGrp="1"/>
-          </p:cNvSpPr>
-          <p:nvPr>
-            <p:ph type="sldNum" sz="quarter" idx="15"/>
-          </p:nvPr>
-        </p:nvSpPr>
-        <p:spPr>
-          <a:xfrm>
-            <a:off x="11697005" y="6489700"/>
-            <a:ext cx="375932" cy="254015"/>
-          </a:xfrm>
-        </p:spPr>
-        <p:txBody>
-          <a:bodyPr anchor="b">
-            <a:normAutofit/>
-          </a:bodyPr>
+            <a:endParaRPr lang="en-GB" dirty="0"/>
+          </a:p>
+        </p:txBody>
+      </p:sp>
+      <p:sp>
+        <p:nvSpPr>
+          <p:cNvPr id="4" name="Dian numeron paikkamerkki 3">
+            <a:extLst>
+              <a:ext uri="{FF2B5EF4-FFF2-40B4-BE49-F238E27FC236}">
+                <a16:creationId xmlns:a16="http://schemas.microsoft.com/office/drawing/2014/main" id="{4ED9DC2E-721D-41C4-AD04-132BF4A7DB02}"/>
+              </a:ext>
+            </a:extLst>
+          </p:cNvPr>
+          <p:cNvSpPr>
+            <a:spLocks noGrp="1"/>
+          </p:cNvSpPr>
+          <p:nvPr>
+            <p:ph type="sldNum" sz="quarter" idx="4"/>
+          </p:nvPr>
+        </p:nvSpPr>
+        <p:spPr/>
+        <p:txBody>
+          <a:bodyPr/>
           <a:lstStyle/>
           <a:p>
-            <a:pPr>
-              <a:spcAft>
-                <a:spcPts val="600"/>
-              </a:spcAft>
-            </a:pPr>
             <a:r>
               <a:rPr lang="en-GB" noProof="0"/>
               <a:t>|  </a:t>
             </a:r>
             <a:fld id="{CDC8994D-33BE-6F4B-918B-78B2D731EB1C}" type="slidenum">
               <a:rPr lang="en-GB" noProof="0" smtClean="0"/>
-              <a:pPr>
-                <a:spcAft>
-                  <a:spcPts val="600"/>
-                </a:spcAft>
-              </a:pPr>
+              <a:pPr/>
               <a:t>18</a:t>
             </a:fld>
             <a:endParaRPr lang="en-GB" noProof="0"/>
@@ -15549,7 +16503,7 @@
     </p:spTree>
     <p:extLst>
       <p:ext uri="{BB962C8B-B14F-4D97-AF65-F5344CB8AC3E}">
-        <p14:creationId xmlns:p14="http://schemas.microsoft.com/office/powerpoint/2010/main" val="2170928529"/>
+        <p14:creationId xmlns:p14="http://schemas.microsoft.com/office/powerpoint/2010/main" val="2269648405"/>
       </p:ext>
     </p:extLst>
   </p:cSld>
@@ -15597,20 +16551,97 @@
           <a:bodyPr/>
           <a:lstStyle/>
           <a:p>
+            <a:r>
+              <a:rPr lang="en-GB" dirty="0">
+                <a:latin typeface="Arial"/>
+                <a:cs typeface="Arial"/>
+              </a:rPr>
+              <a:t> </a:t>
+            </a:r>
+            <a:r>
+              <a:rPr lang="en-US" dirty="0" err="1">
+                <a:latin typeface="Arial"/>
+                <a:cs typeface="Arial"/>
+              </a:rPr>
+              <a:t>DeepSORT</a:t>
+            </a:r>
             <a:br>
               <a:rPr lang="en-US" dirty="0">
                 <a:latin typeface="Arial"/>
                 <a:cs typeface="Arial"/>
               </a:rPr>
             </a:br>
-            <a:r>
-              <a:rPr lang="en-US" sz="3200" b="0" dirty="0">
-                <a:latin typeface="Arial"/>
-                <a:cs typeface="Arial"/>
+            <a:endParaRPr lang="en-US" dirty="0">
+              <a:latin typeface="Arial"/>
+              <a:cs typeface="Arial"/>
+            </a:endParaRPr>
+          </a:p>
+        </p:txBody>
+      </p:sp>
+      <p:sp>
+        <p:nvSpPr>
+          <p:cNvPr id="3" name="Content Placeholder 2">
+            <a:extLst>
+              <a:ext uri="{FF2B5EF4-FFF2-40B4-BE49-F238E27FC236}">
+                <a16:creationId xmlns:a16="http://schemas.microsoft.com/office/drawing/2014/main" id="{A26C880C-874F-4BE2-8686-58B461EFA3E7}"/>
+              </a:ext>
+            </a:extLst>
+          </p:cNvPr>
+          <p:cNvSpPr>
+            <a:spLocks noGrp="1"/>
+          </p:cNvSpPr>
+          <p:nvPr>
+            <p:ph idx="1"/>
+          </p:nvPr>
+        </p:nvSpPr>
+        <p:spPr>
+          <a:xfrm>
+            <a:off x="410399" y="1707297"/>
+            <a:ext cx="11286605" cy="4351338"/>
+          </a:xfrm>
+        </p:spPr>
+        <p:txBody>
+          <a:bodyPr vert="horz" lIns="91440" tIns="45720" rIns="91440" bIns="45720" rtlCol="0" anchor="t">
+            <a:noAutofit/>
+          </a:bodyPr>
+          <a:lstStyle/>
+          <a:p>
+            <a:pPr marL="571500" indent="-571500"/>
+            <a:r>
+              <a:rPr lang="en-US" sz="2800" dirty="0" err="1">
+                <a:ea typeface="+mn-lt"/>
+                <a:cs typeface="+mn-lt"/>
               </a:rPr>
-              <a:t>Kalman Filter</a:t>
-            </a:r>
-            <a:endParaRPr lang="en-US" sz="3200" b="0" dirty="0"/>
+              <a:t>DeepSort</a:t>
+            </a:r>
+            <a:r>
+              <a:rPr lang="en-US" sz="2800" dirty="0">
+                <a:ea typeface="+mn-lt"/>
+                <a:cs typeface="+mn-lt"/>
+              </a:rPr>
+              <a:t> is a traditional single-hypothesis multi-target tracking method using recursive Kalman filtering and frame-by-frame data correlation.</a:t>
+            </a:r>
+          </a:p>
+          <a:p>
+            <a:pPr marL="571500" indent="-571500"/>
+            <a:r>
+              <a:rPr lang="en-US" sz="2800" dirty="0" err="1">
+                <a:ea typeface="+mn-lt"/>
+                <a:cs typeface="+mn-lt"/>
+              </a:rPr>
+              <a:t>DeepSort</a:t>
+            </a:r>
+            <a:r>
+              <a:rPr lang="en-US" sz="2800" dirty="0">
+                <a:ea typeface="+mn-lt"/>
+                <a:cs typeface="+mn-lt"/>
+              </a:rPr>
+              <a:t> adopts the fusion metric that combining the distance of predicted position and the observed position in the Markov space and the cosine distance of the apparent feature between the bounding boxes in the Kalman filter.</a:t>
+            </a:r>
+            <a:endParaRPr lang="en-US" sz="2800" dirty="0">
+              <a:ea typeface="+mj-ea"/>
+              <a:cs typeface="Arial" panose="020B0604020202020204"/>
+            </a:endParaRPr>
           </a:p>
         </p:txBody>
       </p:sp>
@@ -15648,114 +16679,10 @@
           </a:p>
         </p:txBody>
       </p:sp>
-      <p:sp>
-        <p:nvSpPr>
-          <p:cNvPr id="19" name="Title 1">
-            <a:extLst>
-              <a:ext uri="{FF2B5EF4-FFF2-40B4-BE49-F238E27FC236}">
-                <a16:creationId xmlns:a16="http://schemas.microsoft.com/office/drawing/2014/main" id="{FB8FBD9E-5734-4F3A-A6C9-9C9B019246DD}"/>
-              </a:ext>
-            </a:extLst>
-          </p:cNvPr>
-          <p:cNvSpPr txBox="1">
-            <a:spLocks/>
-          </p:cNvSpPr>
-          <p:nvPr/>
-        </p:nvSpPr>
-        <p:spPr>
-          <a:xfrm>
-            <a:off x="835969" y="5679255"/>
-            <a:ext cx="10515600" cy="645616"/>
-          </a:xfrm>
-          <a:prstGeom prst="rect">
-            <a:avLst/>
-          </a:prstGeom>
-        </p:spPr>
-        <p:txBody>
-          <a:bodyPr vert="horz" lIns="91440" tIns="45720" rIns="91440" bIns="45720" rtlCol="0" anchor="t" anchorCtr="0">
-            <a:noAutofit/>
-          </a:bodyPr>
-          <a:lstStyle>
-            <a:lvl1pPr algn="l" defTabSz="914400" rtl="0" eaLnBrk="1" latinLnBrk="0" hangingPunct="1">
-              <a:lnSpc>
-                <a:spcPct val="90000"/>
-              </a:lnSpc>
-              <a:spcBef>
-                <a:spcPct val="0"/>
-              </a:spcBef>
-              <a:buNone/>
-              <a:defRPr sz="4000" b="1" i="0" kern="1200">
-                <a:solidFill>
-                  <a:srgbClr val="4E008E"/>
-                </a:solidFill>
-                <a:latin typeface="Arial" panose="020B0604020202020204" pitchFamily="34" charset="0"/>
-                <a:ea typeface="+mj-ea"/>
-                <a:cs typeface="Arial" panose="020B0604020202020204" pitchFamily="34" charset="0"/>
-              </a:defRPr>
-            </a:lvl1pPr>
-          </a:lstStyle>
-          <a:p>
-            <a:r>
-              <a:rPr lang="en-US" sz="2400" b="0">
-                <a:solidFill>
-                  <a:schemeClr val="tx1"/>
-                </a:solidFill>
-                <a:latin typeface="Arial"/>
-                <a:cs typeface="Arial"/>
-              </a:rPr>
-              <a:t>Source:</a:t>
-            </a:r>
-            <a:r>
-              <a:rPr lang="en-US" sz="1800" b="0" u="sng">
-                <a:latin typeface="Arial"/>
-                <a:cs typeface="Arial"/>
-                <a:hlinkClick r:id="rId2"/>
-              </a:rPr>
-              <a:t>https://www.codeproject.com/Articles/865935/Object-Tracking-Kalman-Filter-with-Ease</a:t>
-            </a:r>
-            <a:endParaRPr lang="en-US" sz="1800" b="0">
-              <a:solidFill>
-                <a:schemeClr val="tx1"/>
-              </a:solidFill>
-              <a:latin typeface="Arial"/>
-              <a:cs typeface="Arial"/>
-            </a:endParaRPr>
-          </a:p>
-        </p:txBody>
-      </p:sp>
-      <p:pic>
-        <p:nvPicPr>
-          <p:cNvPr id="7" name="Picture 7" descr="Diagram&#10;&#10;Description automatically generated">
-            <a:extLst>
-              <a:ext uri="{FF2B5EF4-FFF2-40B4-BE49-F238E27FC236}">
-                <a16:creationId xmlns:a16="http://schemas.microsoft.com/office/drawing/2014/main" id="{EB99B61D-D275-415B-AB72-468F05ECB3B8}"/>
-              </a:ext>
-            </a:extLst>
-          </p:cNvPr>
-          <p:cNvPicPr>
-            <a:picLocks noGrp="1" noChangeAspect="1"/>
-          </p:cNvPicPr>
-          <p:nvPr>
-            <p:ph idx="1"/>
-          </p:nvPr>
-        </p:nvPicPr>
-        <p:blipFill>
-          <a:blip r:embed="rId3"/>
-          <a:stretch>
-            <a:fillRect/>
-          </a:stretch>
-        </p:blipFill>
-        <p:spPr>
-          <a:xfrm>
-            <a:off x="1069423" y="2120751"/>
-            <a:ext cx="8679969" cy="3553184"/>
-          </a:xfrm>
-        </p:spPr>
-      </p:pic>
     </p:spTree>
     <p:extLst>
       <p:ext uri="{BB962C8B-B14F-4D97-AF65-F5344CB8AC3E}">
-        <p14:creationId xmlns:p14="http://schemas.microsoft.com/office/powerpoint/2010/main" val="234449183"/>
+        <p14:creationId xmlns:p14="http://schemas.microsoft.com/office/powerpoint/2010/main" val="1704128306"/>
       </p:ext>
     </p:extLst>
   </p:cSld>
@@ -15951,6 +16878,707 @@
       </p:grpSpPr>
       <p:sp>
         <p:nvSpPr>
+          <p:cNvPr id="4" name="Slide Number Placeholder 3">
+            <a:extLst>
+              <a:ext uri="{FF2B5EF4-FFF2-40B4-BE49-F238E27FC236}">
+                <a16:creationId xmlns:a16="http://schemas.microsoft.com/office/drawing/2014/main" id="{BE7E65FD-92F3-4B67-AB28-5D4DBC38BB45}"/>
+              </a:ext>
+            </a:extLst>
+          </p:cNvPr>
+          <p:cNvSpPr>
+            <a:spLocks noGrp="1"/>
+          </p:cNvSpPr>
+          <p:nvPr>
+            <p:ph type="sldNum" sz="quarter" idx="4"/>
+          </p:nvPr>
+        </p:nvSpPr>
+        <p:spPr/>
+        <p:txBody>
+          <a:bodyPr/>
+          <a:lstStyle/>
+          <a:p>
+            <a:r>
+              <a:rPr lang="en-GB" noProof="0"/>
+              <a:t>|  </a:t>
+            </a:r>
+            <a:fld id="{CDC8994D-33BE-6F4B-918B-78B2D731EB1C}" type="slidenum">
+              <a:rPr lang="en-GB" noProof="0" smtClean="0"/>
+              <a:pPr/>
+              <a:t>20</a:t>
+            </a:fld>
+            <a:endParaRPr lang="en-GB" noProof="0"/>
+          </a:p>
+        </p:txBody>
+      </p:sp>
+      <p:pic>
+        <p:nvPicPr>
+          <p:cNvPr id="15" name="Picture 15" descr="Diagram&#10;&#10;Description automatically generated">
+            <a:extLst>
+              <a:ext uri="{FF2B5EF4-FFF2-40B4-BE49-F238E27FC236}">
+                <a16:creationId xmlns:a16="http://schemas.microsoft.com/office/drawing/2014/main" id="{8A743F83-B233-451D-BAF3-B11EC68643B3}"/>
+              </a:ext>
+            </a:extLst>
+          </p:cNvPr>
+          <p:cNvPicPr>
+            <a:picLocks noGrp="1" noChangeAspect="1"/>
+          </p:cNvPicPr>
+          <p:nvPr>
+            <p:ph idx="1"/>
+          </p:nvPr>
+        </p:nvPicPr>
+        <p:blipFill>
+          <a:blip r:embed="rId2"/>
+          <a:stretch>
+            <a:fillRect/>
+          </a:stretch>
+        </p:blipFill>
+        <p:spPr>
+          <a:xfrm>
+            <a:off x="410400" y="1480008"/>
+            <a:ext cx="10515600" cy="3945719"/>
+          </a:xfrm>
+        </p:spPr>
+      </p:pic>
+      <p:sp>
+        <p:nvSpPr>
+          <p:cNvPr id="19" name="Title 1">
+            <a:extLst>
+              <a:ext uri="{FF2B5EF4-FFF2-40B4-BE49-F238E27FC236}">
+                <a16:creationId xmlns:a16="http://schemas.microsoft.com/office/drawing/2014/main" id="{FB8FBD9E-5734-4F3A-A6C9-9C9B019246DD}"/>
+              </a:ext>
+            </a:extLst>
+          </p:cNvPr>
+          <p:cNvSpPr txBox="1">
+            <a:spLocks/>
+          </p:cNvSpPr>
+          <p:nvPr/>
+        </p:nvSpPr>
+        <p:spPr>
+          <a:xfrm>
+            <a:off x="835969" y="5679255"/>
+            <a:ext cx="10515600" cy="645616"/>
+          </a:xfrm>
+          <a:prstGeom prst="rect">
+            <a:avLst/>
+          </a:prstGeom>
+        </p:spPr>
+        <p:txBody>
+          <a:bodyPr vert="horz" lIns="91440" tIns="45720" rIns="91440" bIns="45720" rtlCol="0" anchor="t" anchorCtr="0">
+            <a:noAutofit/>
+          </a:bodyPr>
+          <a:lstStyle>
+            <a:lvl1pPr algn="l" defTabSz="914400" rtl="0" eaLnBrk="1" latinLnBrk="0" hangingPunct="1">
+              <a:lnSpc>
+                <a:spcPct val="90000"/>
+              </a:lnSpc>
+              <a:spcBef>
+                <a:spcPct val="0"/>
+              </a:spcBef>
+              <a:buNone/>
+              <a:defRPr sz="4000" b="1" i="0" kern="1200">
+                <a:solidFill>
+                  <a:srgbClr val="4E008E"/>
+                </a:solidFill>
+                <a:latin typeface="Arial" panose="020B0604020202020204" pitchFamily="34" charset="0"/>
+                <a:ea typeface="+mj-ea"/>
+                <a:cs typeface="Arial" panose="020B0604020202020204" pitchFamily="34" charset="0"/>
+              </a:defRPr>
+            </a:lvl1pPr>
+          </a:lstStyle>
+          <a:p>
+            <a:r>
+              <a:rPr lang="en-US" sz="2400" b="0" dirty="0">
+                <a:solidFill>
+                  <a:schemeClr val="tx1"/>
+                </a:solidFill>
+                <a:latin typeface="Arial"/>
+                <a:cs typeface="Arial"/>
+              </a:rPr>
+              <a:t>Figure : The workflow of real-time detection and tracking [1]</a:t>
+            </a:r>
+          </a:p>
+        </p:txBody>
+      </p:sp>
+    </p:spTree>
+    <p:extLst>
+      <p:ext uri="{BB962C8B-B14F-4D97-AF65-F5344CB8AC3E}">
+        <p14:creationId xmlns:p14="http://schemas.microsoft.com/office/powerpoint/2010/main" val="1588009974"/>
+      </p:ext>
+    </p:extLst>
+  </p:cSld>
+  <p:clrMapOvr>
+    <a:masterClrMapping/>
+  </p:clrMapOvr>
+</p:sld>
+</file>
+
+<file path=ppt/slides/slide21.xml><?xml version="1.0" encoding="utf-8"?>
+<p:sld xmlns:a="http://schemas.openxmlformats.org/drawingml/2006/main" xmlns:r="http://schemas.openxmlformats.org/officeDocument/2006/relationships" xmlns:p="http://schemas.openxmlformats.org/presentationml/2006/main">
+  <p:cSld>
+    <p:spTree>
+      <p:nvGrpSpPr>
+        <p:cNvPr id="1" name=""/>
+        <p:cNvGrpSpPr/>
+        <p:nvPr/>
+      </p:nvGrpSpPr>
+      <p:grpSpPr>
+        <a:xfrm>
+          <a:off x="0" y="0"/>
+          <a:ext cx="0" cy="0"/>
+          <a:chOff x="0" y="0"/>
+          <a:chExt cx="0" cy="0"/>
+        </a:xfrm>
+      </p:grpSpPr>
+      <p:sp>
+        <p:nvSpPr>
+          <p:cNvPr id="2" name="Title 1">
+            <a:extLst>
+              <a:ext uri="{FF2B5EF4-FFF2-40B4-BE49-F238E27FC236}">
+                <a16:creationId xmlns:a16="http://schemas.microsoft.com/office/drawing/2014/main" id="{8668099D-2FB9-4C55-B465-E8A526D19632}"/>
+              </a:ext>
+            </a:extLst>
+          </p:cNvPr>
+          <p:cNvSpPr>
+            <a:spLocks noGrp="1"/>
+          </p:cNvSpPr>
+          <p:nvPr>
+            <p:ph type="title"/>
+          </p:nvPr>
+        </p:nvSpPr>
+        <p:spPr>
+          <a:xfrm>
+            <a:off x="410400" y="916517"/>
+            <a:ext cx="10650635" cy="649288"/>
+          </a:xfrm>
+        </p:spPr>
+        <p:txBody>
+          <a:bodyPr anchor="t">
+            <a:normAutofit/>
+          </a:bodyPr>
+          <a:lstStyle/>
+          <a:p>
+            <a:endParaRPr lang="en-US" dirty="0"/>
+          </a:p>
+        </p:txBody>
+      </p:sp>
+      <p:sp>
+        <p:nvSpPr>
+          <p:cNvPr id="5" name="Content Placeholder 4">
+            <a:extLst>
+              <a:ext uri="{FF2B5EF4-FFF2-40B4-BE49-F238E27FC236}">
+                <a16:creationId xmlns:a16="http://schemas.microsoft.com/office/drawing/2014/main" id="{39306DE6-A2B4-4040-ABD5-3BCA767D66B3}"/>
+              </a:ext>
+            </a:extLst>
+          </p:cNvPr>
+          <p:cNvSpPr>
+            <a:spLocks noGrp="1"/>
+          </p:cNvSpPr>
+          <p:nvPr>
+            <p:ph sz="half" idx="2"/>
+          </p:nvPr>
+        </p:nvSpPr>
+        <p:spPr>
+          <a:xfrm>
+            <a:off x="464829" y="4618264"/>
+            <a:ext cx="10099901" cy="1865314"/>
+          </a:xfrm>
+        </p:spPr>
+        <p:txBody>
+          <a:bodyPr vert="horz" lIns="91440" tIns="45720" rIns="91440" bIns="45720" rtlCol="0" anchor="t">
+            <a:normAutofit fontScale="92500" lnSpcReduction="10000"/>
+          </a:bodyPr>
+          <a:lstStyle/>
+          <a:p>
+            <a:pPr>
+              <a:spcBef>
+                <a:spcPct val="0"/>
+              </a:spcBef>
+              <a:spcAft>
+                <a:spcPts val="600"/>
+              </a:spcAft>
+            </a:pPr>
+            <a:r>
+              <a:rPr lang="en-US" dirty="0"/>
+              <a:t>Input: {image, patches, image pyramid}</a:t>
+            </a:r>
+          </a:p>
+          <a:p>
+            <a:pPr>
+              <a:spcBef>
+                <a:spcPct val="0"/>
+              </a:spcBef>
+              <a:spcAft>
+                <a:spcPts val="600"/>
+              </a:spcAft>
+            </a:pPr>
+            <a:r>
+              <a:rPr lang="en-US" dirty="0"/>
+              <a:t>Backbone: {VGG16, ResNet50, ResNeXt-101, Darknet53}</a:t>
+            </a:r>
+            <a:endParaRPr lang="en-US" dirty="0">
+              <a:cs typeface="Arial"/>
+            </a:endParaRPr>
+          </a:p>
+          <a:p>
+            <a:pPr>
+              <a:spcBef>
+                <a:spcPct val="0"/>
+              </a:spcBef>
+              <a:spcAft>
+                <a:spcPts val="600"/>
+              </a:spcAft>
+            </a:pPr>
+            <a:r>
+              <a:rPr lang="en-US" dirty="0">
+                <a:cs typeface="Arial"/>
+              </a:rPr>
+              <a:t>Neck: </a:t>
+            </a:r>
+          </a:p>
+          <a:p>
+            <a:pPr>
+              <a:spcBef>
+                <a:spcPct val="0"/>
+              </a:spcBef>
+              <a:spcAft>
+                <a:spcPts val="600"/>
+              </a:spcAft>
+            </a:pPr>
+            <a:r>
+              <a:rPr lang="en-US" dirty="0">
+                <a:cs typeface="Arial"/>
+              </a:rPr>
+              <a:t>Head:</a:t>
+            </a:r>
+          </a:p>
+          <a:p>
+            <a:pPr lvl="1">
+              <a:spcBef>
+                <a:spcPct val="0"/>
+              </a:spcBef>
+              <a:spcAft>
+                <a:spcPts val="600"/>
+              </a:spcAft>
+              <a:buFont typeface="Wingdings" panose="020B0604020202020204" pitchFamily="34" charset="0"/>
+              <a:buChar char="Ø"/>
+            </a:pPr>
+            <a:r>
+              <a:rPr lang="en-US" dirty="0">
+                <a:cs typeface="Arial"/>
+              </a:rPr>
+              <a:t>Dense Prediction: {RPN, YOLO, SSD, Retina-Net, FCOS}</a:t>
+            </a:r>
+          </a:p>
+          <a:p>
+            <a:pPr lvl="1">
+              <a:spcBef>
+                <a:spcPct val="0"/>
+              </a:spcBef>
+              <a:spcAft>
+                <a:spcPts val="600"/>
+              </a:spcAft>
+              <a:buFont typeface="Wingdings" panose="020B0604020202020204" pitchFamily="34" charset="0"/>
+              <a:buChar char="Ø"/>
+            </a:pPr>
+            <a:r>
+              <a:rPr lang="en-US" dirty="0">
+                <a:cs typeface="Arial"/>
+              </a:rPr>
+              <a:t>Sparse Prediction: {Faster R-CNN, R-FCN} </a:t>
+            </a:r>
+            <a:r>
+              <a:rPr lang="en-US" dirty="0">
+                <a:ea typeface="+mn-lt"/>
+                <a:cs typeface="+mn-lt"/>
+              </a:rPr>
+              <a:t>[2]</a:t>
+            </a:r>
+          </a:p>
+        </p:txBody>
+      </p:sp>
+      <p:sp>
+        <p:nvSpPr>
+          <p:cNvPr id="19" name="Title 1">
+            <a:extLst>
+              <a:ext uri="{FF2B5EF4-FFF2-40B4-BE49-F238E27FC236}">
+                <a16:creationId xmlns:a16="http://schemas.microsoft.com/office/drawing/2014/main" id="{FB8FBD9E-5734-4F3A-A6C9-9C9B019246DD}"/>
+              </a:ext>
+            </a:extLst>
+          </p:cNvPr>
+          <p:cNvSpPr txBox="1">
+            <a:spLocks/>
+          </p:cNvSpPr>
+          <p:nvPr/>
+        </p:nvSpPr>
+        <p:spPr>
+          <a:xfrm>
+            <a:off x="1157287" y="3626985"/>
+            <a:ext cx="9265330" cy="587148"/>
+          </a:xfrm>
+          <a:prstGeom prst="rect">
+            <a:avLst/>
+          </a:prstGeom>
+        </p:spPr>
+        <p:txBody>
+          <a:bodyPr vert="horz" lIns="91440" tIns="45720" rIns="91440" bIns="45720" rtlCol="0" anchor="b" anchorCtr="0">
+            <a:normAutofit/>
+          </a:bodyPr>
+          <a:lstStyle>
+            <a:lvl1pPr algn="l" defTabSz="914400" rtl="0" eaLnBrk="1" latinLnBrk="0" hangingPunct="1">
+              <a:lnSpc>
+                <a:spcPct val="90000"/>
+              </a:lnSpc>
+              <a:spcBef>
+                <a:spcPct val="0"/>
+              </a:spcBef>
+              <a:buNone/>
+              <a:defRPr sz="4000" b="1" i="0" kern="1200">
+                <a:solidFill>
+                  <a:srgbClr val="4E008E"/>
+                </a:solidFill>
+                <a:latin typeface="Arial" panose="020B0604020202020204" pitchFamily="34" charset="0"/>
+                <a:ea typeface="+mj-ea"/>
+                <a:cs typeface="Arial" panose="020B0604020202020204" pitchFamily="34" charset="0"/>
+              </a:defRPr>
+            </a:lvl1pPr>
+          </a:lstStyle>
+          <a:p>
+            <a:pPr>
+              <a:spcAft>
+                <a:spcPts val="600"/>
+              </a:spcAft>
+            </a:pPr>
+            <a:r>
+              <a:rPr lang="en-US" sz="2400" b="0" dirty="0">
+                <a:solidFill>
+                  <a:schemeClr val="tx1"/>
+                </a:solidFill>
+                <a:latin typeface="Arial"/>
+                <a:cs typeface="Arial"/>
+              </a:rPr>
+              <a:t>Figure : Architecture of object detection of YOLOv4 [2]</a:t>
+            </a:r>
+          </a:p>
+        </p:txBody>
+      </p:sp>
+      <p:pic>
+        <p:nvPicPr>
+          <p:cNvPr id="6" name="Picture 6" descr="A picture containing diagram&#10;&#10;Description automatically generated">
+            <a:extLst>
+              <a:ext uri="{FF2B5EF4-FFF2-40B4-BE49-F238E27FC236}">
+                <a16:creationId xmlns:a16="http://schemas.microsoft.com/office/drawing/2014/main" id="{7698726F-F063-4130-8A6E-757FFA95E467}"/>
+              </a:ext>
+            </a:extLst>
+          </p:cNvPr>
+          <p:cNvPicPr>
+            <a:picLocks noGrp="1" noChangeAspect="1"/>
+          </p:cNvPicPr>
+          <p:nvPr>
+            <p:ph sz="quarter" idx="4"/>
+          </p:nvPr>
+        </p:nvPicPr>
+        <p:blipFill>
+          <a:blip r:embed="rId2"/>
+          <a:stretch>
+            <a:fillRect/>
+          </a:stretch>
+        </p:blipFill>
+        <p:spPr>
+          <a:xfrm>
+            <a:off x="1157287" y="1574854"/>
+            <a:ext cx="9406845" cy="2182706"/>
+          </a:xfrm>
+          <a:noFill/>
+        </p:spPr>
+      </p:pic>
+      <p:sp>
+        <p:nvSpPr>
+          <p:cNvPr id="4" name="Slide Number Placeholder 3">
+            <a:extLst>
+              <a:ext uri="{FF2B5EF4-FFF2-40B4-BE49-F238E27FC236}">
+                <a16:creationId xmlns:a16="http://schemas.microsoft.com/office/drawing/2014/main" id="{BE7E65FD-92F3-4B67-AB28-5D4DBC38BB45}"/>
+              </a:ext>
+            </a:extLst>
+          </p:cNvPr>
+          <p:cNvSpPr>
+            <a:spLocks noGrp="1"/>
+          </p:cNvSpPr>
+          <p:nvPr>
+            <p:ph type="sldNum" sz="quarter" idx="15"/>
+          </p:nvPr>
+        </p:nvSpPr>
+        <p:spPr>
+          <a:xfrm>
+            <a:off x="11697005" y="6489700"/>
+            <a:ext cx="375932" cy="254015"/>
+          </a:xfrm>
+        </p:spPr>
+        <p:txBody>
+          <a:bodyPr anchor="b">
+            <a:normAutofit/>
+          </a:bodyPr>
+          <a:lstStyle/>
+          <a:p>
+            <a:pPr>
+              <a:spcAft>
+                <a:spcPts val="600"/>
+              </a:spcAft>
+            </a:pPr>
+            <a:r>
+              <a:rPr lang="en-GB" noProof="0"/>
+              <a:t>|  </a:t>
+            </a:r>
+            <a:fld id="{CDC8994D-33BE-6F4B-918B-78B2D731EB1C}" type="slidenum">
+              <a:rPr lang="en-GB" noProof="0" smtClean="0"/>
+              <a:pPr>
+                <a:spcAft>
+                  <a:spcPts val="600"/>
+                </a:spcAft>
+              </a:pPr>
+              <a:t>21</a:t>
+            </a:fld>
+            <a:endParaRPr lang="en-GB" noProof="0"/>
+          </a:p>
+        </p:txBody>
+      </p:sp>
+    </p:spTree>
+    <p:extLst>
+      <p:ext uri="{BB962C8B-B14F-4D97-AF65-F5344CB8AC3E}">
+        <p14:creationId xmlns:p14="http://schemas.microsoft.com/office/powerpoint/2010/main" val="2170928529"/>
+      </p:ext>
+    </p:extLst>
+  </p:cSld>
+  <p:clrMapOvr>
+    <a:masterClrMapping/>
+  </p:clrMapOvr>
+</p:sld>
+</file>
+
+<file path=ppt/slides/slide22.xml><?xml version="1.0" encoding="utf-8"?>
+<p:sld xmlns:a="http://schemas.openxmlformats.org/drawingml/2006/main" xmlns:r="http://schemas.openxmlformats.org/officeDocument/2006/relationships" xmlns:p="http://schemas.openxmlformats.org/presentationml/2006/main">
+  <p:cSld>
+    <p:spTree>
+      <p:nvGrpSpPr>
+        <p:cNvPr id="1" name=""/>
+        <p:cNvGrpSpPr/>
+        <p:nvPr/>
+      </p:nvGrpSpPr>
+      <p:grpSpPr>
+        <a:xfrm>
+          <a:off x="0" y="0"/>
+          <a:ext cx="0" cy="0"/>
+          <a:chOff x="0" y="0"/>
+          <a:chExt cx="0" cy="0"/>
+        </a:xfrm>
+      </p:grpSpPr>
+      <p:sp>
+        <p:nvSpPr>
+          <p:cNvPr id="2" name="Title 1">
+            <a:extLst>
+              <a:ext uri="{FF2B5EF4-FFF2-40B4-BE49-F238E27FC236}">
+                <a16:creationId xmlns:a16="http://schemas.microsoft.com/office/drawing/2014/main" id="{8668099D-2FB9-4C55-B465-E8A526D19632}"/>
+              </a:ext>
+            </a:extLst>
+          </p:cNvPr>
+          <p:cNvSpPr>
+            <a:spLocks noGrp="1"/>
+          </p:cNvSpPr>
+          <p:nvPr>
+            <p:ph type="title"/>
+          </p:nvPr>
+        </p:nvSpPr>
+        <p:spPr/>
+        <p:txBody>
+          <a:bodyPr/>
+          <a:lstStyle/>
+          <a:p>
+            <a:br>
+              <a:rPr lang="en-US" dirty="0">
+                <a:latin typeface="Arial"/>
+                <a:cs typeface="Arial"/>
+              </a:rPr>
+            </a:br>
+            <a:r>
+              <a:rPr lang="en-US" sz="3200" b="0" dirty="0">
+                <a:latin typeface="Arial"/>
+                <a:cs typeface="Arial"/>
+              </a:rPr>
+              <a:t>Kalman Filter</a:t>
+            </a:r>
+            <a:endParaRPr lang="en-US" sz="3200" b="0" dirty="0"/>
+          </a:p>
+        </p:txBody>
+      </p:sp>
+      <p:sp>
+        <p:nvSpPr>
+          <p:cNvPr id="4" name="Slide Number Placeholder 3">
+            <a:extLst>
+              <a:ext uri="{FF2B5EF4-FFF2-40B4-BE49-F238E27FC236}">
+                <a16:creationId xmlns:a16="http://schemas.microsoft.com/office/drawing/2014/main" id="{BE7E65FD-92F3-4B67-AB28-5D4DBC38BB45}"/>
+              </a:ext>
+            </a:extLst>
+          </p:cNvPr>
+          <p:cNvSpPr>
+            <a:spLocks noGrp="1"/>
+          </p:cNvSpPr>
+          <p:nvPr>
+            <p:ph type="sldNum" sz="quarter" idx="4"/>
+          </p:nvPr>
+        </p:nvSpPr>
+        <p:spPr/>
+        <p:txBody>
+          <a:bodyPr/>
+          <a:lstStyle/>
+          <a:p>
+            <a:r>
+              <a:rPr lang="en-GB" noProof="0"/>
+              <a:t>|  </a:t>
+            </a:r>
+            <a:fld id="{CDC8994D-33BE-6F4B-918B-78B2D731EB1C}" type="slidenum">
+              <a:rPr lang="en-GB" noProof="0" smtClean="0"/>
+              <a:pPr/>
+              <a:t>22</a:t>
+            </a:fld>
+            <a:endParaRPr lang="en-GB" noProof="0"/>
+          </a:p>
+        </p:txBody>
+      </p:sp>
+      <p:sp>
+        <p:nvSpPr>
+          <p:cNvPr id="19" name="Title 1">
+            <a:extLst>
+              <a:ext uri="{FF2B5EF4-FFF2-40B4-BE49-F238E27FC236}">
+                <a16:creationId xmlns:a16="http://schemas.microsoft.com/office/drawing/2014/main" id="{FB8FBD9E-5734-4F3A-A6C9-9C9B019246DD}"/>
+              </a:ext>
+            </a:extLst>
+          </p:cNvPr>
+          <p:cNvSpPr txBox="1">
+            <a:spLocks/>
+          </p:cNvSpPr>
+          <p:nvPr/>
+        </p:nvSpPr>
+        <p:spPr>
+          <a:xfrm>
+            <a:off x="835969" y="5679255"/>
+            <a:ext cx="10515600" cy="645616"/>
+          </a:xfrm>
+          <a:prstGeom prst="rect">
+            <a:avLst/>
+          </a:prstGeom>
+        </p:spPr>
+        <p:txBody>
+          <a:bodyPr vert="horz" lIns="91440" tIns="45720" rIns="91440" bIns="45720" rtlCol="0" anchor="t" anchorCtr="0">
+            <a:noAutofit/>
+          </a:bodyPr>
+          <a:lstStyle>
+            <a:lvl1pPr algn="l" defTabSz="914400" rtl="0" eaLnBrk="1" latinLnBrk="0" hangingPunct="1">
+              <a:lnSpc>
+                <a:spcPct val="90000"/>
+              </a:lnSpc>
+              <a:spcBef>
+                <a:spcPct val="0"/>
+              </a:spcBef>
+              <a:buNone/>
+              <a:defRPr sz="4000" b="1" i="0" kern="1200">
+                <a:solidFill>
+                  <a:srgbClr val="4E008E"/>
+                </a:solidFill>
+                <a:latin typeface="Arial" panose="020B0604020202020204" pitchFamily="34" charset="0"/>
+                <a:ea typeface="+mj-ea"/>
+                <a:cs typeface="Arial" panose="020B0604020202020204" pitchFamily="34" charset="0"/>
+              </a:defRPr>
+            </a:lvl1pPr>
+          </a:lstStyle>
+          <a:p>
+            <a:r>
+              <a:rPr lang="en-US" sz="2400" b="0">
+                <a:solidFill>
+                  <a:schemeClr val="tx1"/>
+                </a:solidFill>
+                <a:latin typeface="Arial"/>
+                <a:cs typeface="Arial"/>
+              </a:rPr>
+              <a:t>Source:</a:t>
+            </a:r>
+            <a:r>
+              <a:rPr lang="en-US" sz="1800" b="0" u="sng">
+                <a:latin typeface="Arial"/>
+                <a:cs typeface="Arial"/>
+                <a:hlinkClick r:id="rId2"/>
+              </a:rPr>
+              <a:t>https://www.codeproject.com/Articles/865935/Object-Tracking-Kalman-Filter-with-Ease</a:t>
+            </a:r>
+            <a:endParaRPr lang="en-US" sz="1800" b="0">
+              <a:solidFill>
+                <a:schemeClr val="tx1"/>
+              </a:solidFill>
+              <a:latin typeface="Arial"/>
+              <a:cs typeface="Arial"/>
+            </a:endParaRPr>
+          </a:p>
+        </p:txBody>
+      </p:sp>
+      <p:pic>
+        <p:nvPicPr>
+          <p:cNvPr id="7" name="Picture 7" descr="Diagram&#10;&#10;Description automatically generated">
+            <a:extLst>
+              <a:ext uri="{FF2B5EF4-FFF2-40B4-BE49-F238E27FC236}">
+                <a16:creationId xmlns:a16="http://schemas.microsoft.com/office/drawing/2014/main" id="{EB99B61D-D275-415B-AB72-468F05ECB3B8}"/>
+              </a:ext>
+            </a:extLst>
+          </p:cNvPr>
+          <p:cNvPicPr>
+            <a:picLocks noGrp="1" noChangeAspect="1"/>
+          </p:cNvPicPr>
+          <p:nvPr>
+            <p:ph idx="1"/>
+          </p:nvPr>
+        </p:nvPicPr>
+        <p:blipFill>
+          <a:blip r:embed="rId3"/>
+          <a:stretch>
+            <a:fillRect/>
+          </a:stretch>
+        </p:blipFill>
+        <p:spPr>
+          <a:xfrm>
+            <a:off x="1069423" y="2120751"/>
+            <a:ext cx="8679969" cy="3553184"/>
+          </a:xfrm>
+        </p:spPr>
+      </p:pic>
+    </p:spTree>
+    <p:extLst>
+      <p:ext uri="{BB962C8B-B14F-4D97-AF65-F5344CB8AC3E}">
+        <p14:creationId xmlns:p14="http://schemas.microsoft.com/office/powerpoint/2010/main" val="234449183"/>
+      </p:ext>
+    </p:extLst>
+  </p:cSld>
+  <p:clrMapOvr>
+    <a:masterClrMapping/>
+  </p:clrMapOvr>
+</p:sld>
+</file>
+
+<file path=ppt/slides/slide23.xml><?xml version="1.0" encoding="utf-8"?>
+<p:sld xmlns:a="http://schemas.openxmlformats.org/drawingml/2006/main" xmlns:r="http://schemas.openxmlformats.org/officeDocument/2006/relationships" xmlns:p="http://schemas.openxmlformats.org/presentationml/2006/main">
+  <p:cSld>
+    <p:spTree>
+      <p:nvGrpSpPr>
+        <p:cNvPr id="1" name=""/>
+        <p:cNvGrpSpPr/>
+        <p:nvPr/>
+      </p:nvGrpSpPr>
+      <p:grpSpPr>
+        <a:xfrm>
+          <a:off x="0" y="0"/>
+          <a:ext cx="0" cy="0"/>
+          <a:chOff x="0" y="0"/>
+          <a:chExt cx="0" cy="0"/>
+        </a:xfrm>
+      </p:grpSpPr>
+      <p:sp>
+        <p:nvSpPr>
           <p:cNvPr id="2" name="Title 1">
             <a:extLst>
               <a:ext uri="{FF2B5EF4-FFF2-40B4-BE49-F238E27FC236}">
@@ -16196,7 +17824,7 @@
             <a:fld id="{CDC8994D-33BE-6F4B-918B-78B2D731EB1C}" type="slidenum">
               <a:rPr lang="en-GB" noProof="0" smtClean="0"/>
               <a:pPr/>
-              <a:t>20</a:t>
+              <a:t>23</a:t>
             </a:fld>
             <a:endParaRPr lang="en-GB" noProof="0"/>
           </a:p>
@@ -16791,18 +18419,18 @@
       </p:grpSpPr>
       <p:sp>
         <p:nvSpPr>
-          <p:cNvPr id="2" name="Title 1">
-            <a:extLst>
-              <a:ext uri="{FF2B5EF4-FFF2-40B4-BE49-F238E27FC236}">
-                <a16:creationId xmlns:a16="http://schemas.microsoft.com/office/drawing/2014/main" id="{BDD32476-B097-4F2F-B080-92DB3DC87E31}"/>
-              </a:ext>
-            </a:extLst>
-          </p:cNvPr>
-          <p:cNvSpPr>
-            <a:spLocks noGrp="1"/>
-          </p:cNvSpPr>
-          <p:nvPr>
-            <p:ph type="title"/>
+          <p:cNvPr id="2" name="Otsikko 1">
+            <a:extLst>
+              <a:ext uri="{FF2B5EF4-FFF2-40B4-BE49-F238E27FC236}">
+                <a16:creationId xmlns:a16="http://schemas.microsoft.com/office/drawing/2014/main" id="{C9D29DCB-8672-4F13-926F-8A06186E3F5D}"/>
+              </a:ext>
+            </a:extLst>
+          </p:cNvPr>
+          <p:cNvSpPr>
+            <a:spLocks noGrp="1"/>
+          </p:cNvSpPr>
+          <p:nvPr>
+            <p:ph type="ctrTitle"/>
           </p:nvPr>
         </p:nvSpPr>
         <p:spPr/>
@@ -16810,24 +18438,27 @@
           <a:bodyPr/>
           <a:lstStyle/>
           <a:p>
-            <a:endParaRPr lang="fi-FI"/>
-          </a:p>
-        </p:txBody>
-      </p:sp>
-      <p:sp>
-        <p:nvSpPr>
-          <p:cNvPr id="3" name="Content Placeholder 2">
-            <a:extLst>
-              <a:ext uri="{FF2B5EF4-FFF2-40B4-BE49-F238E27FC236}">
-                <a16:creationId xmlns:a16="http://schemas.microsoft.com/office/drawing/2014/main" id="{EA036355-BD8E-4464-8A37-79A19B2A52FE}"/>
-              </a:ext>
-            </a:extLst>
-          </p:cNvPr>
-          <p:cNvSpPr>
-            <a:spLocks noGrp="1"/>
-          </p:cNvSpPr>
-          <p:nvPr>
-            <p:ph idx="1"/>
+            <a:r>
+              <a:rPr lang="en-GB" dirty="0"/>
+              <a:t>Pipeline version 1</a:t>
+            </a:r>
+          </a:p>
+        </p:txBody>
+      </p:sp>
+      <p:sp>
+        <p:nvSpPr>
+          <p:cNvPr id="3" name="Alaotsikko 2">
+            <a:extLst>
+              <a:ext uri="{FF2B5EF4-FFF2-40B4-BE49-F238E27FC236}">
+                <a16:creationId xmlns:a16="http://schemas.microsoft.com/office/drawing/2014/main" id="{B08725A3-CA23-4E94-9005-AAC1886FA951}"/>
+              </a:ext>
+            </a:extLst>
+          </p:cNvPr>
+          <p:cNvSpPr>
+            <a:spLocks noGrp="1"/>
+          </p:cNvSpPr>
+          <p:nvPr>
+            <p:ph type="subTitle" idx="1"/>
           </p:nvPr>
         </p:nvSpPr>
         <p:spPr/>
@@ -16835,16 +18466,16 @@
           <a:bodyPr/>
           <a:lstStyle/>
           <a:p>
-            <a:endParaRPr lang="fi-FI"/>
-          </a:p>
-        </p:txBody>
-      </p:sp>
-      <p:sp>
-        <p:nvSpPr>
-          <p:cNvPr id="4" name="Slide Number Placeholder 3">
-            <a:extLst>
-              <a:ext uri="{FF2B5EF4-FFF2-40B4-BE49-F238E27FC236}">
-                <a16:creationId xmlns:a16="http://schemas.microsoft.com/office/drawing/2014/main" id="{AE5624AE-1EFC-4DC3-B15A-06B8BCC2D917}"/>
+            <a:endParaRPr lang="en-GB"/>
+          </a:p>
+        </p:txBody>
+      </p:sp>
+      <p:sp>
+        <p:nvSpPr>
+          <p:cNvPr id="4" name="Dian numeron paikkamerkki 3">
+            <a:extLst>
+              <a:ext uri="{FF2B5EF4-FFF2-40B4-BE49-F238E27FC236}">
+                <a16:creationId xmlns:a16="http://schemas.microsoft.com/office/drawing/2014/main" id="{0243873F-4068-4663-BC2F-B440DBF3DD72}"/>
               </a:ext>
             </a:extLst>
           </p:cNvPr>
@@ -16876,7 +18507,7 @@
     </p:spTree>
     <p:extLst>
       <p:ext uri="{BB962C8B-B14F-4D97-AF65-F5344CB8AC3E}">
-        <p14:creationId xmlns:p14="http://schemas.microsoft.com/office/powerpoint/2010/main" val="1749541492"/>
+        <p14:creationId xmlns:p14="http://schemas.microsoft.com/office/powerpoint/2010/main" val="1960136453"/>
       </p:ext>
     </p:extLst>
   </p:cSld>
@@ -16908,7 +18539,7 @@
           <p:cNvPr id="2" name="Title 1">
             <a:extLst>
               <a:ext uri="{FF2B5EF4-FFF2-40B4-BE49-F238E27FC236}">
-                <a16:creationId xmlns:a16="http://schemas.microsoft.com/office/drawing/2014/main" id="{8915BC18-3E25-409E-9120-C5252531460A}"/>
+                <a16:creationId xmlns:a16="http://schemas.microsoft.com/office/drawing/2014/main" id="{BDD32476-B097-4F2F-B080-92DB3DC87E31}"/>
               </a:ext>
             </a:extLst>
           </p:cNvPr>
@@ -16924,7 +18555,7 @@
           <a:bodyPr/>
           <a:lstStyle/>
           <a:p>
-            <a:endParaRPr lang="fi-FI"/>
+            <a:endParaRPr lang="fi-FI" dirty="0"/>
           </a:p>
         </p:txBody>
       </p:sp>
@@ -16933,7 +18564,7 @@
           <p:cNvPr id="3" name="Content Placeholder 2">
             <a:extLst>
               <a:ext uri="{FF2B5EF4-FFF2-40B4-BE49-F238E27FC236}">
-                <a16:creationId xmlns:a16="http://schemas.microsoft.com/office/drawing/2014/main" id="{C2A4B2B7-CD5F-41FE-8F40-185B7828A0F3}"/>
+                <a16:creationId xmlns:a16="http://schemas.microsoft.com/office/drawing/2014/main" id="{EA036355-BD8E-4464-8A37-79A19B2A52FE}"/>
               </a:ext>
             </a:extLst>
           </p:cNvPr>
@@ -16958,7 +18589,7 @@
           <p:cNvPr id="4" name="Slide Number Placeholder 3">
             <a:extLst>
               <a:ext uri="{FF2B5EF4-FFF2-40B4-BE49-F238E27FC236}">
-                <a16:creationId xmlns:a16="http://schemas.microsoft.com/office/drawing/2014/main" id="{A2E88699-765B-4810-B34E-A5DC6093214D}"/>
+                <a16:creationId xmlns:a16="http://schemas.microsoft.com/office/drawing/2014/main" id="{AE5624AE-1EFC-4DC3-B15A-06B8BCC2D917}"/>
               </a:ext>
             </a:extLst>
           </p:cNvPr>
@@ -16990,7 +18621,7 @@
     </p:spTree>
     <p:extLst>
       <p:ext uri="{BB962C8B-B14F-4D97-AF65-F5344CB8AC3E}">
-        <p14:creationId xmlns:p14="http://schemas.microsoft.com/office/powerpoint/2010/main" val="630459756"/>
+        <p14:creationId xmlns:p14="http://schemas.microsoft.com/office/powerpoint/2010/main" val="1749541492"/>
       </p:ext>
     </p:extLst>
   </p:cSld>
@@ -17022,7 +18653,7 @@
           <p:cNvPr id="2" name="Title 1">
             <a:extLst>
               <a:ext uri="{FF2B5EF4-FFF2-40B4-BE49-F238E27FC236}">
-                <a16:creationId xmlns:a16="http://schemas.microsoft.com/office/drawing/2014/main" id="{BF04C64C-2440-4094-84AC-6BF087852A6E}"/>
+                <a16:creationId xmlns:a16="http://schemas.microsoft.com/office/drawing/2014/main" id="{8915BC18-3E25-409E-9120-C5252531460A}"/>
               </a:ext>
             </a:extLst>
           </p:cNvPr>
@@ -17038,7 +18669,7 @@
           <a:bodyPr/>
           <a:lstStyle/>
           <a:p>
-            <a:endParaRPr lang="fi-FI"/>
+            <a:endParaRPr lang="fi-FI" dirty="0"/>
           </a:p>
         </p:txBody>
       </p:sp>
@@ -17047,7 +18678,7 @@
           <p:cNvPr id="3" name="Content Placeholder 2">
             <a:extLst>
               <a:ext uri="{FF2B5EF4-FFF2-40B4-BE49-F238E27FC236}">
-                <a16:creationId xmlns:a16="http://schemas.microsoft.com/office/drawing/2014/main" id="{9C893AEF-9F78-4ECE-8A70-7567AF562E16}"/>
+                <a16:creationId xmlns:a16="http://schemas.microsoft.com/office/drawing/2014/main" id="{C2A4B2B7-CD5F-41FE-8F40-185B7828A0F3}"/>
               </a:ext>
             </a:extLst>
           </p:cNvPr>
@@ -17072,7 +18703,7 @@
           <p:cNvPr id="4" name="Slide Number Placeholder 3">
             <a:extLst>
               <a:ext uri="{FF2B5EF4-FFF2-40B4-BE49-F238E27FC236}">
-                <a16:creationId xmlns:a16="http://schemas.microsoft.com/office/drawing/2014/main" id="{C0EC0766-DACB-4237-B39B-E45B5B9599B3}"/>
+                <a16:creationId xmlns:a16="http://schemas.microsoft.com/office/drawing/2014/main" id="{A2E88699-765B-4810-B34E-A5DC6093214D}"/>
               </a:ext>
             </a:extLst>
           </p:cNvPr>
@@ -17104,7 +18735,7 @@
     </p:spTree>
     <p:extLst>
       <p:ext uri="{BB962C8B-B14F-4D97-AF65-F5344CB8AC3E}">
-        <p14:creationId xmlns:p14="http://schemas.microsoft.com/office/powerpoint/2010/main" val="285762340"/>
+        <p14:creationId xmlns:p14="http://schemas.microsoft.com/office/powerpoint/2010/main" val="630459756"/>
       </p:ext>
     </p:extLst>
   </p:cSld>
@@ -17136,7 +18767,7 @@
           <p:cNvPr id="2" name="Title 1">
             <a:extLst>
               <a:ext uri="{FF2B5EF4-FFF2-40B4-BE49-F238E27FC236}">
-                <a16:creationId xmlns:a16="http://schemas.microsoft.com/office/drawing/2014/main" id="{3DBA98CA-884F-4C6E-A9F0-B599557B85A7}"/>
+                <a16:creationId xmlns:a16="http://schemas.microsoft.com/office/drawing/2014/main" id="{BF04C64C-2440-4094-84AC-6BF087852A6E}"/>
               </a:ext>
             </a:extLst>
           </p:cNvPr>
@@ -17161,7 +18792,7 @@
           <p:cNvPr id="3" name="Content Placeholder 2">
             <a:extLst>
               <a:ext uri="{FF2B5EF4-FFF2-40B4-BE49-F238E27FC236}">
-                <a16:creationId xmlns:a16="http://schemas.microsoft.com/office/drawing/2014/main" id="{71182AAF-924A-4F15-8312-CA9C0249E41D}"/>
+                <a16:creationId xmlns:a16="http://schemas.microsoft.com/office/drawing/2014/main" id="{9C893AEF-9F78-4ECE-8A70-7567AF562E16}"/>
               </a:ext>
             </a:extLst>
           </p:cNvPr>
@@ -17186,7 +18817,7 @@
           <p:cNvPr id="4" name="Slide Number Placeholder 3">
             <a:extLst>
               <a:ext uri="{FF2B5EF4-FFF2-40B4-BE49-F238E27FC236}">
-                <a16:creationId xmlns:a16="http://schemas.microsoft.com/office/drawing/2014/main" id="{E174144E-02AB-4DBE-AADB-986851563288}"/>
+                <a16:creationId xmlns:a16="http://schemas.microsoft.com/office/drawing/2014/main" id="{C0EC0766-DACB-4237-B39B-E45B5B9599B3}"/>
               </a:ext>
             </a:extLst>
           </p:cNvPr>
@@ -17218,7 +18849,7 @@
     </p:spTree>
     <p:extLst>
       <p:ext uri="{BB962C8B-B14F-4D97-AF65-F5344CB8AC3E}">
-        <p14:creationId xmlns:p14="http://schemas.microsoft.com/office/powerpoint/2010/main" val="1128859354"/>
+        <p14:creationId xmlns:p14="http://schemas.microsoft.com/office/powerpoint/2010/main" val="285762340"/>
       </p:ext>
     </p:extLst>
   </p:cSld>

</xml_diff>

<commit_message>
some final touches to the presentation
</commit_message>
<xml_diff>
--- a/Power point files/Final presentation.pptx
+++ b/Power point files/Final presentation.pptx
@@ -16018,7 +16018,7 @@
             <a:pPr marL="571500" indent="-571500" algn="just"/>
             <a:r>
               <a:rPr lang="en-US" sz="2400" dirty="0"/>
-              <a:t> Beside the detection of sound event presence there is a need for detecting the direction of arrival (DOA) of the detected sound event. For such cases Deep Learning methods are often used but requires annotated data which is laborious and difficult to do reliably</a:t>
+              <a:t>Beside the detection of sound event presence there is a need for detecting the direction of arrival (DOA) of the detected sound event. For such cases Deep Learning methods are often used but requires annotated data which is laborious and difficult to do reliably</a:t>
             </a:r>
           </a:p>
           <a:p>
@@ -22146,117 +22146,241 @@
           <a:lstStyle/>
           <a:p>
             <a:r>
-              <a:rPr lang="fi-FI" dirty="0"/>
+              <a:rPr lang="fi-FI" sz="2400" dirty="0"/>
               <a:t>YOLO video </a:t>
             </a:r>
             <a:r>
-              <a:rPr lang="fi-FI" dirty="0" err="1"/>
+              <a:rPr lang="fi-FI" sz="2400" dirty="0" err="1"/>
               <a:t>detection</a:t>
             </a:r>
             <a:r>
-              <a:rPr lang="fi-FI" dirty="0"/>
+              <a:rPr lang="fi-FI" sz="2400" dirty="0"/>
               <a:t> </a:t>
             </a:r>
             <a:r>
-              <a:rPr lang="fi-FI" dirty="0" err="1"/>
+              <a:rPr lang="fi-FI" sz="2400" dirty="0" err="1"/>
               <a:t>network</a:t>
             </a:r>
-            <a:endParaRPr lang="fi-FI" dirty="0"/>
-          </a:p>
-          <a:p>
-            <a:r>
-              <a:rPr lang="fi-FI" dirty="0" err="1"/>
+            <a:endParaRPr lang="fi-FI" sz="2400" dirty="0"/>
+          </a:p>
+          <a:p>
+            <a:r>
+              <a:rPr lang="fi-FI" sz="2400" dirty="0" err="1"/>
               <a:t>Equirectangular</a:t>
             </a:r>
             <a:r>
-              <a:rPr lang="fi-FI" dirty="0"/>
+              <a:rPr lang="fi-FI" sz="2400" dirty="0"/>
               <a:t> video </a:t>
             </a:r>
             <a:r>
-              <a:rPr lang="fi-FI" dirty="0" err="1"/>
+              <a:rPr lang="fi-FI" sz="2400" dirty="0" err="1"/>
               <a:t>frames</a:t>
             </a:r>
             <a:r>
-              <a:rPr lang="fi-FI" dirty="0"/>
+              <a:rPr lang="fi-FI" sz="2400" dirty="0"/>
               <a:t> </a:t>
             </a:r>
             <a:r>
-              <a:rPr lang="fi-FI" dirty="0" err="1"/>
+              <a:rPr lang="fi-FI" sz="2400" dirty="0" err="1"/>
               <a:t>projected</a:t>
             </a:r>
             <a:r>
-              <a:rPr lang="fi-FI" dirty="0"/>
+              <a:rPr lang="fi-FI" sz="2400" dirty="0"/>
               <a:t> to 4 </a:t>
             </a:r>
             <a:r>
-              <a:rPr lang="fi-FI" dirty="0" err="1"/>
+              <a:rPr lang="fi-FI" sz="2400" dirty="0" err="1"/>
               <a:t>sub</a:t>
             </a:r>
             <a:r>
-              <a:rPr lang="fi-FI" dirty="0"/>
+              <a:rPr lang="fi-FI" sz="2400" dirty="0"/>
               <a:t> image </a:t>
             </a:r>
             <a:r>
-              <a:rPr lang="fi-FI" dirty="0" err="1"/>
+              <a:rPr lang="fi-FI" sz="2400" dirty="0" err="1"/>
               <a:t>planes</a:t>
             </a:r>
             <a:r>
-              <a:rPr lang="fi-FI" dirty="0"/>
+              <a:rPr lang="fi-FI" sz="2400" dirty="0"/>
               <a:t>, </a:t>
             </a:r>
             <a:r>
-              <a:rPr lang="fi-FI" dirty="0" err="1"/>
+              <a:rPr lang="fi-FI" sz="2400" dirty="0" err="1"/>
               <a:t>which</a:t>
             </a:r>
             <a:r>
-              <a:rPr lang="fi-FI" dirty="0"/>
+              <a:rPr lang="fi-FI" sz="2400" dirty="0"/>
               <a:t> is </a:t>
             </a:r>
             <a:r>
-              <a:rPr lang="fi-FI" dirty="0" err="1"/>
+              <a:rPr lang="fi-FI" sz="2400" dirty="0" err="1"/>
               <a:t>fed</a:t>
             </a:r>
             <a:r>
-              <a:rPr lang="fi-FI" dirty="0"/>
+              <a:rPr lang="fi-FI" sz="2400" dirty="0"/>
               <a:t> to </a:t>
             </a:r>
             <a:r>
-              <a:rPr lang="fi-FI" dirty="0" err="1"/>
+              <a:rPr lang="fi-FI" sz="2400" dirty="0" err="1"/>
               <a:t>the</a:t>
             </a:r>
             <a:r>
-              <a:rPr lang="fi-FI" dirty="0"/>
+              <a:rPr lang="fi-FI" sz="2400" dirty="0"/>
               <a:t> </a:t>
             </a:r>
             <a:r>
-              <a:rPr lang="fi-FI" dirty="0" err="1"/>
+              <a:rPr lang="fi-FI" sz="2400" dirty="0" err="1"/>
               <a:t>detector</a:t>
             </a:r>
-            <a:endParaRPr lang="fi-FI" dirty="0"/>
+            <a:endParaRPr lang="fi-FI" sz="2400" dirty="0"/>
           </a:p>
           <a:p>
             <a:pPr lvl="1"/>
             <a:r>
-              <a:rPr lang="fi-FI" dirty="0" err="1"/>
+              <a:rPr lang="fi-FI" sz="2400" dirty="0" err="1"/>
               <a:t>So</a:t>
             </a:r>
             <a:r>
-              <a:rPr lang="fi-FI" dirty="0"/>
+              <a:rPr lang="fi-FI" sz="2400" dirty="0"/>
               <a:t> 4 YOLO </a:t>
             </a:r>
             <a:r>
-              <a:rPr lang="fi-FI" dirty="0" err="1"/>
+              <a:rPr lang="fi-FI" sz="2400" dirty="0" err="1"/>
               <a:t>detections</a:t>
             </a:r>
             <a:r>
-              <a:rPr lang="fi-FI" dirty="0"/>
+              <a:rPr lang="fi-FI" sz="2400" dirty="0"/>
               <a:t> per 360 </a:t>
             </a:r>
             <a:r>
-              <a:rPr lang="fi-FI" dirty="0" err="1"/>
+              <a:rPr lang="fi-FI" sz="2400" dirty="0" err="1"/>
               <a:t>frame</a:t>
             </a:r>
-            <a:endParaRPr lang="fi-FI" dirty="0"/>
+            <a:endParaRPr lang="fi-FI" sz="2400" dirty="0"/>
+          </a:p>
+          <a:p>
+            <a:pPr lvl="1"/>
+            <a:r>
+              <a:rPr lang="fi-FI" sz="2400" dirty="0" err="1"/>
+              <a:t>Mp</a:t>
+            </a:r>
+            <a:r>
+              <a:rPr lang="fi-FI" sz="2400" dirty="0"/>
+              <a:t>-YOLO –</a:t>
+            </a:r>
+            <a:r>
+              <a:rPr lang="fi-FI" sz="2400" dirty="0" err="1"/>
+              <a:t>project</a:t>
+            </a:r>
+            <a:r>
+              <a:rPr lang="fi-FI" sz="2400" dirty="0"/>
+              <a:t> (</a:t>
+            </a:r>
+            <a:r>
+              <a:rPr lang="fi-FI" sz="2400" dirty="0" err="1"/>
+              <a:t>by</a:t>
+            </a:r>
+            <a:r>
+              <a:rPr lang="fi-FI" sz="2400" dirty="0"/>
+              <a:t> </a:t>
+            </a:r>
+            <a:r>
+              <a:rPr lang="en-US" sz="2400" dirty="0">
+                <a:ea typeface="+mn-lt"/>
+                <a:cs typeface="+mn-lt"/>
+              </a:rPr>
+              <a:t>Tsung-Shan, Yang) provided the projection implementation</a:t>
+            </a:r>
+          </a:p>
+          <a:p>
+            <a:pPr lvl="1"/>
+            <a:r>
+              <a:rPr lang="en-US" sz="2400" dirty="0">
+                <a:ea typeface="+mn-lt"/>
+                <a:cs typeface="+mn-lt"/>
+              </a:rPr>
+              <a:t>We complemented the code to process video files, fixed a minor bug and added the functionality to output detections to a csv-file</a:t>
+            </a:r>
+            <a:endParaRPr lang="fi-FI" sz="2400" dirty="0"/>
+          </a:p>
+          <a:p>
+            <a:r>
+              <a:rPr lang="fi-FI" sz="2400" dirty="0" err="1"/>
+              <a:t>Detections</a:t>
+            </a:r>
+            <a:r>
+              <a:rPr lang="fi-FI" sz="2400" dirty="0"/>
+              <a:t> in </a:t>
+            </a:r>
+            <a:r>
+              <a:rPr lang="fi-FI" sz="2400" dirty="0" err="1"/>
+              <a:t>sub</a:t>
+            </a:r>
+            <a:r>
+              <a:rPr lang="fi-FI" sz="2400" dirty="0"/>
+              <a:t> </a:t>
+            </a:r>
+            <a:r>
+              <a:rPr lang="fi-FI" sz="2400" dirty="0" err="1"/>
+              <a:t>images</a:t>
+            </a:r>
+            <a:r>
+              <a:rPr lang="fi-FI" sz="2400" dirty="0"/>
+              <a:t> -&gt; </a:t>
+            </a:r>
+            <a:r>
+              <a:rPr lang="fi-FI" sz="2400" dirty="0" err="1"/>
+              <a:t>Detection</a:t>
+            </a:r>
+            <a:r>
+              <a:rPr lang="fi-FI" sz="2400" dirty="0"/>
+              <a:t> </a:t>
+            </a:r>
+            <a:r>
+              <a:rPr lang="fi-FI" sz="2400" dirty="0" err="1"/>
+              <a:t>coordinates</a:t>
+            </a:r>
+            <a:r>
+              <a:rPr lang="fi-FI" sz="2400" dirty="0"/>
+              <a:t> </a:t>
+            </a:r>
+            <a:r>
+              <a:rPr lang="fi-FI" sz="2400" dirty="0" err="1"/>
+              <a:t>transformed</a:t>
+            </a:r>
+            <a:r>
+              <a:rPr lang="fi-FI" sz="2400" dirty="0"/>
+              <a:t> </a:t>
+            </a:r>
+            <a:r>
+              <a:rPr lang="fi-FI" sz="2400" dirty="0" err="1"/>
+              <a:t>back</a:t>
+            </a:r>
+            <a:r>
+              <a:rPr lang="fi-FI" sz="2400" dirty="0"/>
+              <a:t> to </a:t>
+            </a:r>
+            <a:r>
+              <a:rPr lang="fi-FI" sz="2400" dirty="0" err="1"/>
+              <a:t>equirectangular</a:t>
+            </a:r>
+            <a:r>
+              <a:rPr lang="fi-FI" sz="2400" dirty="0"/>
+              <a:t> </a:t>
+            </a:r>
+            <a:r>
+              <a:rPr lang="fi-FI" sz="2400" dirty="0" err="1"/>
+              <a:t>frame</a:t>
+            </a:r>
+            <a:r>
+              <a:rPr lang="fi-FI" sz="2400" dirty="0"/>
+              <a:t> </a:t>
+            </a:r>
+            <a:r>
+              <a:rPr lang="fi-FI" sz="2400" dirty="0" err="1"/>
+              <a:t>coordinates</a:t>
+            </a:r>
+            <a:endParaRPr lang="fi-FI" sz="2400" dirty="0"/>
           </a:p>
         </p:txBody>
       </p:sp>

</xml_diff>